<commit_message>
Addition of Math material
</commit_message>
<xml_diff>
--- a/dynamic programming/DP Nivel 0.pptx
+++ b/dynamic programming/DP Nivel 0.pptx
@@ -5,7 +5,7 @@
     <p:sldMasterId id="2147483648" r:id="rId1"/>
   </p:sldMasterIdLst>
   <p:notesMasterIdLst>
-    <p:notesMasterId r:id="rId30"/>
+    <p:notesMasterId r:id="rId29"/>
   </p:notesMasterIdLst>
   <p:sldIdLst>
     <p:sldId id="258" r:id="rId2"/>
@@ -17,25 +17,24 @@
     <p:sldId id="318" r:id="rId8"/>
     <p:sldId id="307" r:id="rId9"/>
     <p:sldId id="316" r:id="rId10"/>
-    <p:sldId id="317" r:id="rId11"/>
-    <p:sldId id="323" r:id="rId12"/>
-    <p:sldId id="319" r:id="rId13"/>
-    <p:sldId id="322" r:id="rId14"/>
-    <p:sldId id="321" r:id="rId15"/>
-    <p:sldId id="324" r:id="rId16"/>
-    <p:sldId id="325" r:id="rId17"/>
-    <p:sldId id="327" r:id="rId18"/>
-    <p:sldId id="326" r:id="rId19"/>
-    <p:sldId id="328" r:id="rId20"/>
-    <p:sldId id="330" r:id="rId21"/>
-    <p:sldId id="329" r:id="rId22"/>
-    <p:sldId id="331" r:id="rId23"/>
-    <p:sldId id="332" r:id="rId24"/>
-    <p:sldId id="333" r:id="rId25"/>
-    <p:sldId id="334" r:id="rId26"/>
-    <p:sldId id="335" r:id="rId27"/>
-    <p:sldId id="336" r:id="rId28"/>
-    <p:sldId id="291" r:id="rId29"/>
+    <p:sldId id="323" r:id="rId11"/>
+    <p:sldId id="319" r:id="rId12"/>
+    <p:sldId id="322" r:id="rId13"/>
+    <p:sldId id="321" r:id="rId14"/>
+    <p:sldId id="324" r:id="rId15"/>
+    <p:sldId id="325" r:id="rId16"/>
+    <p:sldId id="327" r:id="rId17"/>
+    <p:sldId id="326" r:id="rId18"/>
+    <p:sldId id="328" r:id="rId19"/>
+    <p:sldId id="330" r:id="rId20"/>
+    <p:sldId id="329" r:id="rId21"/>
+    <p:sldId id="331" r:id="rId22"/>
+    <p:sldId id="332" r:id="rId23"/>
+    <p:sldId id="333" r:id="rId24"/>
+    <p:sldId id="334" r:id="rId25"/>
+    <p:sldId id="335" r:id="rId26"/>
+    <p:sldId id="336" r:id="rId27"/>
+    <p:sldId id="291" r:id="rId28"/>
   </p:sldIdLst>
   <p:sldSz cx="9144000" cy="6858000" type="screen4x3"/>
   <p:notesSz cx="6858000" cy="9144000"/>
@@ -148,7 +147,6 @@
             <p14:sldId id="318"/>
             <p14:sldId id="307"/>
             <p14:sldId id="316"/>
-            <p14:sldId id="317"/>
             <p14:sldId id="323"/>
             <p14:sldId id="319"/>
             <p14:sldId id="322"/>
@@ -283,8 +281,8 @@
   <inkml:trace contextRef="#ctx0" brushRef="#br0" timeOffset="30892.54">2911 10459 1881 0,'0'0'832'16,"0"0"-330"-16,0 0-215 15,0 0-74-15,0 0-79 0,0 0-37 16,-122 80-43-16,78-37-31 16,0 1-14-16,1-1-3 15,8-3-3-15,8-6-3 16,9-11-54-16,10-11-123 15,5-6-122-15,3-6-209 16,0 0-173-16</inkml:trace>
   <inkml:trace contextRef="#ctx0" brushRef="#br0" timeOffset="32455.91">2032 11694 1126 0,'0'0'372'15,"0"0"0"-15,0 0-108 16,0 0-32-16,0 0-64 16,0 0-31-16,0 0 18 15,-131 104 12-15,102-57-5 16,0 9-6-16,0 5-13 16,2 5-44-16,8-1-27 15,5 0-1-15,10-3-31 0,4-4-20 16,6-6-9-16,27-8-11 15,12-10 0-15,14-8 0 16,3-10 12-16,2-8-11 16,-9-4 1-16,-12-4-2 15,-16 0-33-15,-20 2-215 16,-7 2-281-16,0 5-481 0</inkml:trace>
   <inkml:trace contextRef="#ctx0" brushRef="#br0" timeOffset="33708.56">2462 11993 1217 0,'0'0'635'16,"0"0"-275"-16,0 0-52 16,0 0-62-16,0 0-54 15,0 0-29-15,0 0-13 16,110 42-21-16,-86-8-11 16,-10 6 17-16,-8 3-27 15,-6 1-52-15,0-4-29 16,-18-4 4-16,-4-8-31 15,0-8-6-15,4-7-103 16,2-9-26-16,6-4-33 16,2 0-48-16,4-7-11 0,4-7-18 15,0-2-21 1,4-1 19-16,23-2-104 0,-2 7-48 16,-3 1-339-16</inkml:trace>
-  <inkml:trace contextRef="#ctx0" brushRef="#br0" timeOffset="34006.76">2824 12049 1185 0,'0'0'273'16,"0"0"85"-16,0 0-88 15,0 0-37-15,-114 97-4 0,89-61-51 16,6 2-34-16,7-6-29 16,12-4-21-16,0-6-21 15,4-6-31-15,21-6 2 16,6-4 5-16,8-6 2 16,5 0-14-16,-2 0-20 15,-4-1-17-15,-10-6-13 16,-11 7-131-16,-11 0-342 15,-6 0-497-15</inkml:trace>
-  <inkml:trace contextRef="#ctx0" brushRef="#br0" timeOffset="34234.16">3113 12461 1852 0,'0'0'555'0,"0"0"-7"16,-7 123-234-16,-5-74-106 15,-2-10-71-15,3-8-89 16,4-9-36-16,2-12-12 16,3-8-11-16,2-2-67 15,0-23-141-15,7-10-234 16,8 1-279-16</inkml:trace>
+  <inkml:trace contextRef="#ctx0" brushRef="#br0" timeOffset="34006.75">2824 12049 1185 0,'0'0'273'16,"0"0"85"-16,0 0-88 15,0 0-37-15,-114 97-4 0,89-61-51 16,6 2-34-16,7-6-29 16,12-4-21-16,0-6-21 15,4-6-31-15,21-6 2 16,6-4 5-16,8-6 2 16,5 0-14-16,-2 0-20 15,-4-1-17-15,-10-6-13 16,-11 7-131-16,-11 0-342 15,-6 0-497-15</inkml:trace>
+  <inkml:trace contextRef="#ctx0" brushRef="#br0" timeOffset="34234.15">3113 12461 1852 0,'0'0'555'0,"0"0"-7"16,-7 123-234-16,-5-74-106 15,-2-10-71-15,3-8-89 16,4-9-36-16,2-12-12 16,3-8-11-16,2-2-67 15,0-23-141-15,7-10-234 16,8 1-279-16</inkml:trace>
   <inkml:trace contextRef="#ctx0" brushRef="#br0" timeOffset="34856.49">3434 12340 1101 0,'0'0'354'16,"0"0"131"-16,0 0-206 15,0 0-18-15,0 0-56 16,0 0-18-16,0 0-21 15,-2 20-26-15,13-20 13 16,6-16 12-16,8-8-14 0,2-5-41 16,-2-2-29-1,-3-3-24-15,-7 4-11 0,-3 3-13 16,-9 10-10-16,0 6-10 16,-3 10-4-16,0 1-9 15,0 0-16-15,0 7-27 16,-9 18 20-16,0 5 14 15,1 8 4-15,1 2 4 16,7-2-5-16,0-4 0 16,0-8-2-16,4-8 1 15,11-6 1-15,4-8 4 16,1-4 2-16,3 0 0 0,3-12 0 16,0-7-53-16,0-6-163 15,-2 8-166-15,-9 2-426 16</inkml:trace>
   <inkml:trace contextRef="#ctx0" brushRef="#br0" timeOffset="35073.92">3561 11909 1627 0,'0'0'747'0,"0"0"-372"16,0 0-89-16,0 0-102 16,0 0-68-16,0 0-60 0,0 0-38 15,0 0-18-15,0 0-181 16,5 0-376-16,3 0-646 0</inkml:trace>
   <inkml:trace contextRef="#ctx0" brushRef="#br0" timeOffset="35404.03">3855 11812 1753 0,'0'0'621'16,"0"0"-150"-16,0 0-161 15,0 0-65-15,124 89 19 16,-78-32-12-16,-7 6-72 16,-7 3-180-16,-12-1 0 15,-11-5 0-15,-9-12 0 16,0-8 0-16,0-12 0 15,-7-9 0-15,1-6-51 16,0-5-270-16,4-6-207 0,0-2-214 16</inkml:trace>
@@ -377,7 +375,7 @@
             <a:fld id="{F4FAB538-628E-104D-8583-83FBDA663EAD}" type="datetimeFigureOut">
               <a:rPr lang="en-US" smtClean="0"/>
               <a:pPr/>
-              <a:t>11/4/2020</a:t>
+              <a:t>2/10/2021</a:t>
             </a:fld>
             <a:endParaRPr lang="en-US" dirty="0"/>
           </a:p>
@@ -806,7 +804,7 @@
     </p:spTree>
     <p:extLst>
       <p:ext uri="{BB962C8B-B14F-4D97-AF65-F5344CB8AC3E}">
-        <p14:creationId xmlns:p14="http://schemas.microsoft.com/office/powerpoint/2010/main" val="2534215666"/>
+        <p14:creationId xmlns:p14="http://schemas.microsoft.com/office/powerpoint/2010/main" val="1341930175"/>
       </p:ext>
     </p:extLst>
   </p:cSld>
@@ -891,7 +889,7 @@
     </p:spTree>
     <p:extLst>
       <p:ext uri="{BB962C8B-B14F-4D97-AF65-F5344CB8AC3E}">
-        <p14:creationId xmlns:p14="http://schemas.microsoft.com/office/powerpoint/2010/main" val="1341930175"/>
+        <p14:creationId xmlns:p14="http://schemas.microsoft.com/office/powerpoint/2010/main" val="1600130074"/>
       </p:ext>
     </p:extLst>
   </p:cSld>
@@ -976,7 +974,7 @@
     </p:spTree>
     <p:extLst>
       <p:ext uri="{BB962C8B-B14F-4D97-AF65-F5344CB8AC3E}">
-        <p14:creationId xmlns:p14="http://schemas.microsoft.com/office/powerpoint/2010/main" val="1600130074"/>
+        <p14:creationId xmlns:p14="http://schemas.microsoft.com/office/powerpoint/2010/main" val="984018175"/>
       </p:ext>
     </p:extLst>
   </p:cSld>
@@ -1061,7 +1059,7 @@
     </p:spTree>
     <p:extLst>
       <p:ext uri="{BB962C8B-B14F-4D97-AF65-F5344CB8AC3E}">
-        <p14:creationId xmlns:p14="http://schemas.microsoft.com/office/powerpoint/2010/main" val="984018175"/>
+        <p14:creationId xmlns:p14="http://schemas.microsoft.com/office/powerpoint/2010/main" val="1293692305"/>
       </p:ext>
     </p:extLst>
   </p:cSld>
@@ -1146,7 +1144,7 @@
     </p:spTree>
     <p:extLst>
       <p:ext uri="{BB962C8B-B14F-4D97-AF65-F5344CB8AC3E}">
-        <p14:creationId xmlns:p14="http://schemas.microsoft.com/office/powerpoint/2010/main" val="1293692305"/>
+        <p14:creationId xmlns:p14="http://schemas.microsoft.com/office/powerpoint/2010/main" val="3410678606"/>
       </p:ext>
     </p:extLst>
   </p:cSld>
@@ -1231,7 +1229,7 @@
     </p:spTree>
     <p:extLst>
       <p:ext uri="{BB962C8B-B14F-4D97-AF65-F5344CB8AC3E}">
-        <p14:creationId xmlns:p14="http://schemas.microsoft.com/office/powerpoint/2010/main" val="3410678606"/>
+        <p14:creationId xmlns:p14="http://schemas.microsoft.com/office/powerpoint/2010/main" val="3247882134"/>
       </p:ext>
     </p:extLst>
   </p:cSld>
@@ -1307,92 +1305,7 @@
             <a:fld id="{39923DF9-DA97-0C44-B7A0-AB7B1AA67FC3}" type="slidenum">
               <a:rPr lang="en-US" smtClean="0"/>
               <a:pPr/>
-              <a:t>18</a:t>
-            </a:fld>
-            <a:endParaRPr lang="en-US" dirty="0"/>
-          </a:p>
-        </p:txBody>
-      </p:sp>
-    </p:spTree>
-    <p:extLst>
-      <p:ext uri="{BB962C8B-B14F-4D97-AF65-F5344CB8AC3E}">
-        <p14:creationId xmlns:p14="http://schemas.microsoft.com/office/powerpoint/2010/main" val="3247882134"/>
-      </p:ext>
-    </p:extLst>
-  </p:cSld>
-  <p:clrMapOvr>
-    <a:masterClrMapping/>
-  </p:clrMapOvr>
-</p:notes>
-</file>
-
-<file path=ppt/notesSlides/notesSlide17.xml><?xml version="1.0" encoding="utf-8"?>
-<p:notes xmlns:a="http://schemas.openxmlformats.org/drawingml/2006/main" xmlns:r="http://schemas.openxmlformats.org/officeDocument/2006/relationships" xmlns:p="http://schemas.openxmlformats.org/presentationml/2006/main">
-  <p:cSld>
-    <p:spTree>
-      <p:nvGrpSpPr>
-        <p:cNvPr id="1" name=""/>
-        <p:cNvGrpSpPr/>
-        <p:nvPr/>
-      </p:nvGrpSpPr>
-      <p:grpSpPr>
-        <a:xfrm>
-          <a:off x="0" y="0"/>
-          <a:ext cx="0" cy="0"/>
-          <a:chOff x="0" y="0"/>
-          <a:chExt cx="0" cy="0"/>
-        </a:xfrm>
-      </p:grpSpPr>
-      <p:sp>
-        <p:nvSpPr>
-          <p:cNvPr id="2" name="Slide Image Placeholder 1"/>
-          <p:cNvSpPr>
-            <a:spLocks noGrp="1" noRot="1" noChangeAspect="1"/>
-          </p:cNvSpPr>
-          <p:nvPr>
-            <p:ph type="sldImg"/>
-          </p:nvPr>
-        </p:nvSpPr>
-        <p:spPr/>
-      </p:sp>
-      <p:sp>
-        <p:nvSpPr>
-          <p:cNvPr id="3" name="Notes Placeholder 2"/>
-          <p:cNvSpPr>
-            <a:spLocks noGrp="1"/>
-          </p:cNvSpPr>
-          <p:nvPr>
-            <p:ph type="body" idx="1"/>
-          </p:nvPr>
-        </p:nvSpPr>
-        <p:spPr/>
-        <p:txBody>
-          <a:bodyPr/>
-          <a:lstStyle/>
-          <a:p>
-            <a:endParaRPr lang="en-US" dirty="0"/>
-          </a:p>
-        </p:txBody>
-      </p:sp>
-      <p:sp>
-        <p:nvSpPr>
-          <p:cNvPr id="4" name="Slide Number Placeholder 3"/>
-          <p:cNvSpPr>
-            <a:spLocks noGrp="1"/>
-          </p:cNvSpPr>
-          <p:nvPr>
-            <p:ph type="sldNum" sz="quarter" idx="10"/>
-          </p:nvPr>
-        </p:nvSpPr>
-        <p:spPr/>
-        <p:txBody>
-          <a:bodyPr/>
-          <a:lstStyle/>
-          <a:p>
-            <a:fld id="{39923DF9-DA97-0C44-B7A0-AB7B1AA67FC3}" type="slidenum">
-              <a:rPr lang="en-US" smtClean="0"/>
-              <a:pPr/>
-              <a:t>28</a:t>
+              <a:t>27</a:t>
             </a:fld>
             <a:endParaRPr lang="en-US" dirty="0"/>
           </a:p>
@@ -1996,7 +1909,7 @@
     </p:spTree>
     <p:extLst>
       <p:ext uri="{BB962C8B-B14F-4D97-AF65-F5344CB8AC3E}">
-        <p14:creationId xmlns:p14="http://schemas.microsoft.com/office/powerpoint/2010/main" val="3096355342"/>
+        <p14:creationId xmlns:p14="http://schemas.microsoft.com/office/powerpoint/2010/main" val="2301012289"/>
       </p:ext>
     </p:extLst>
   </p:cSld>
@@ -2081,7 +1994,7 @@
     </p:spTree>
     <p:extLst>
       <p:ext uri="{BB962C8B-B14F-4D97-AF65-F5344CB8AC3E}">
-        <p14:creationId xmlns:p14="http://schemas.microsoft.com/office/powerpoint/2010/main" val="2301012289"/>
+        <p14:creationId xmlns:p14="http://schemas.microsoft.com/office/powerpoint/2010/main" val="2534215666"/>
       </p:ext>
     </p:extLst>
   </p:cSld>
@@ -2391,7 +2304,7 @@
             <a:fld id="{818F800F-9FA6-FE45-B974-AB17141DF911}" type="datetimeFigureOut">
               <a:rPr lang="en-US" smtClean="0"/>
               <a:pPr/>
-              <a:t>11/4/2020</a:t>
+              <a:t>2/10/2021</a:t>
             </a:fld>
             <a:endParaRPr lang="en-US" dirty="0"/>
           </a:p>
@@ -2788,7 +2701,7 @@
             <a:fld id="{818F800F-9FA6-FE45-B974-AB17141DF911}" type="datetimeFigureOut">
               <a:rPr lang="en-US" smtClean="0"/>
               <a:pPr/>
-              <a:t>11/4/2020</a:t>
+              <a:t>2/10/2021</a:t>
             </a:fld>
             <a:endParaRPr lang="en-US" dirty="0"/>
           </a:p>
@@ -3078,7 +2991,7 @@
             <a:fld id="{818F800F-9FA6-FE45-B974-AB17141DF911}" type="datetimeFigureOut">
               <a:rPr lang="en-US" smtClean="0"/>
               <a:pPr/>
-              <a:t>11/4/2020</a:t>
+              <a:t>2/10/2021</a:t>
             </a:fld>
             <a:endParaRPr lang="en-US" dirty="0"/>
           </a:p>
@@ -3502,7 +3415,7 @@
             <a:fld id="{818F800F-9FA6-FE45-B974-AB17141DF911}" type="datetimeFigureOut">
               <a:rPr lang="en-US" smtClean="0"/>
               <a:pPr/>
-              <a:t>11/4/2020</a:t>
+              <a:t>2/10/2021</a:t>
             </a:fld>
             <a:endParaRPr lang="en-US" dirty="0"/>
           </a:p>
@@ -3622,7 +3535,7 @@
             <a:fld id="{818F800F-9FA6-FE45-B974-AB17141DF911}" type="datetimeFigureOut">
               <a:rPr lang="en-US" smtClean="0"/>
               <a:pPr/>
-              <a:t>11/4/2020</a:t>
+              <a:t>2/10/2021</a:t>
             </a:fld>
             <a:endParaRPr lang="en-US" dirty="0"/>
           </a:p>
@@ -3973,7 +3886,7 @@
             <a:fld id="{818F800F-9FA6-FE45-B974-AB17141DF911}" type="datetimeFigureOut">
               <a:rPr lang="en-US" smtClean="0"/>
               <a:pPr/>
-              <a:t>11/4/2020</a:t>
+              <a:t>2/10/2021</a:t>
             </a:fld>
             <a:endParaRPr lang="en-US" dirty="0"/>
           </a:p>
@@ -4583,10 +4496,10 @@
       </p:sp>
       <p:pic>
         <p:nvPicPr>
-          <p:cNvPr id="7" name="Picture 6">
+          <p:cNvPr id="3" name="Picture 2">
             <a:extLst>
               <a:ext uri="{FF2B5EF4-FFF2-40B4-BE49-F238E27FC236}">
-                <a16:creationId xmlns:a16="http://schemas.microsoft.com/office/drawing/2014/main" id="{726C41FB-F981-4497-ABCF-E64350687514}"/>
+                <a16:creationId xmlns:a16="http://schemas.microsoft.com/office/drawing/2014/main" id="{CDDF8491-7314-49F3-BBE6-D55551CDD5F9}"/>
               </a:ext>
             </a:extLst>
           </p:cNvPr>
@@ -4603,8 +4516,8 @@
         </p:blipFill>
         <p:spPr>
           <a:xfrm>
-            <a:off x="0" y="2652117"/>
-            <a:ext cx="9144000" cy="1553766"/>
+            <a:off x="0" y="1158254"/>
+            <a:ext cx="9144000" cy="5115208"/>
           </a:xfrm>
           <a:prstGeom prst="rect">
             <a:avLst/>
@@ -4614,7 +4527,7 @@
     </p:spTree>
     <p:extLst>
       <p:ext uri="{BB962C8B-B14F-4D97-AF65-F5344CB8AC3E}">
-        <p14:creationId xmlns:p14="http://schemas.microsoft.com/office/powerpoint/2010/main" val="640680186"/>
+        <p14:creationId xmlns:p14="http://schemas.microsoft.com/office/powerpoint/2010/main" val="1195849772"/>
       </p:ext>
     </p:extLst>
   </p:cSld>
@@ -4708,10 +4621,10 @@
       </p:sp>
       <p:pic>
         <p:nvPicPr>
-          <p:cNvPr id="3" name="Picture 2">
+          <p:cNvPr id="4" name="Picture 3">
             <a:extLst>
               <a:ext uri="{FF2B5EF4-FFF2-40B4-BE49-F238E27FC236}">
-                <a16:creationId xmlns:a16="http://schemas.microsoft.com/office/drawing/2014/main" id="{CDDF8491-7314-49F3-BBE6-D55551CDD5F9}"/>
+                <a16:creationId xmlns:a16="http://schemas.microsoft.com/office/drawing/2014/main" id="{068AC1A0-DC71-48D0-A0D0-7A4186F76298}"/>
               </a:ext>
             </a:extLst>
           </p:cNvPr>
@@ -4728,8 +4641,8 @@
         </p:blipFill>
         <p:spPr>
           <a:xfrm>
-            <a:off x="0" y="1158254"/>
-            <a:ext cx="9144000" cy="5115208"/>
+            <a:off x="781050" y="2005012"/>
+            <a:ext cx="7581900" cy="2847975"/>
           </a:xfrm>
           <a:prstGeom prst="rect">
             <a:avLst/>
@@ -4739,7 +4652,7 @@
     </p:spTree>
     <p:extLst>
       <p:ext uri="{BB962C8B-B14F-4D97-AF65-F5344CB8AC3E}">
-        <p14:creationId xmlns:p14="http://schemas.microsoft.com/office/powerpoint/2010/main" val="1195849772"/>
+        <p14:creationId xmlns:p14="http://schemas.microsoft.com/office/powerpoint/2010/main" val="4020165547"/>
       </p:ext>
     </p:extLst>
   </p:cSld>
@@ -4833,10 +4746,10 @@
       </p:sp>
       <p:pic>
         <p:nvPicPr>
-          <p:cNvPr id="4" name="Picture 3">
+          <p:cNvPr id="3" name="Picture 2">
             <a:extLst>
               <a:ext uri="{FF2B5EF4-FFF2-40B4-BE49-F238E27FC236}">
-                <a16:creationId xmlns:a16="http://schemas.microsoft.com/office/drawing/2014/main" id="{068AC1A0-DC71-48D0-A0D0-7A4186F76298}"/>
+                <a16:creationId xmlns:a16="http://schemas.microsoft.com/office/drawing/2014/main" id="{874A532A-7DB2-4378-92A6-8A9B7B3F9D0B}"/>
               </a:ext>
             </a:extLst>
           </p:cNvPr>
@@ -4853,8 +4766,8 @@
         </p:blipFill>
         <p:spPr>
           <a:xfrm>
-            <a:off x="781050" y="2005012"/>
-            <a:ext cx="7581900" cy="2847975"/>
+            <a:off x="776287" y="2519362"/>
+            <a:ext cx="7591425" cy="1819275"/>
           </a:xfrm>
           <a:prstGeom prst="rect">
             <a:avLst/>
@@ -4864,7 +4777,7 @@
     </p:spTree>
     <p:extLst>
       <p:ext uri="{BB962C8B-B14F-4D97-AF65-F5344CB8AC3E}">
-        <p14:creationId xmlns:p14="http://schemas.microsoft.com/office/powerpoint/2010/main" val="4020165547"/>
+        <p14:creationId xmlns:p14="http://schemas.microsoft.com/office/powerpoint/2010/main" val="1847814418"/>
       </p:ext>
     </p:extLst>
   </p:cSld>
@@ -4951,131 +4864,6 @@
                 <a:latin typeface="Arial" panose="020B0604020202020204" pitchFamily="34" charset="0"/>
                 <a:cs typeface="Arial" panose="020B0604020202020204" pitchFamily="34" charset="0"/>
               </a:rPr>
-              <a:t>Conteo de subconjuntos</a:t>
-            </a:r>
-          </a:p>
-        </p:txBody>
-      </p:sp>
-      <p:pic>
-        <p:nvPicPr>
-          <p:cNvPr id="3" name="Picture 2">
-            <a:extLst>
-              <a:ext uri="{FF2B5EF4-FFF2-40B4-BE49-F238E27FC236}">
-                <a16:creationId xmlns:a16="http://schemas.microsoft.com/office/drawing/2014/main" id="{874A532A-7DB2-4378-92A6-8A9B7B3F9D0B}"/>
-              </a:ext>
-            </a:extLst>
-          </p:cNvPr>
-          <p:cNvPicPr>
-            <a:picLocks noChangeAspect="1"/>
-          </p:cNvPicPr>
-          <p:nvPr/>
-        </p:nvPicPr>
-        <p:blipFill>
-          <a:blip r:embed="rId4"/>
-          <a:stretch>
-            <a:fillRect/>
-          </a:stretch>
-        </p:blipFill>
-        <p:spPr>
-          <a:xfrm>
-            <a:off x="776287" y="2519362"/>
-            <a:ext cx="7591425" cy="1819275"/>
-          </a:xfrm>
-          <a:prstGeom prst="rect">
-            <a:avLst/>
-          </a:prstGeom>
-        </p:spPr>
-      </p:pic>
-    </p:spTree>
-    <p:extLst>
-      <p:ext uri="{BB962C8B-B14F-4D97-AF65-F5344CB8AC3E}">
-        <p14:creationId xmlns:p14="http://schemas.microsoft.com/office/powerpoint/2010/main" val="1847814418"/>
-      </p:ext>
-    </p:extLst>
-  </p:cSld>
-  <p:clrMapOvr>
-    <a:masterClrMapping/>
-  </p:clrMapOvr>
-</p:sld>
-</file>
-
-<file path=ppt/slides/slide14.xml><?xml version="1.0" encoding="utf-8"?>
-<p:sld xmlns:a="http://schemas.openxmlformats.org/drawingml/2006/main" xmlns:r="http://schemas.openxmlformats.org/officeDocument/2006/relationships" xmlns:p="http://schemas.openxmlformats.org/presentationml/2006/main">
-  <p:cSld>
-    <p:spTree>
-      <p:nvGrpSpPr>
-        <p:cNvPr id="1" name=""/>
-        <p:cNvGrpSpPr/>
-        <p:nvPr/>
-      </p:nvGrpSpPr>
-      <p:grpSpPr>
-        <a:xfrm>
-          <a:off x="0" y="0"/>
-          <a:ext cx="0" cy="0"/>
-          <a:chOff x="0" y="0"/>
-          <a:chExt cx="0" cy="0"/>
-        </a:xfrm>
-      </p:grpSpPr>
-      <p:pic>
-        <p:nvPicPr>
-          <p:cNvPr id="2" name="Picture 1"/>
-          <p:cNvPicPr>
-            <a:picLocks noChangeAspect="1"/>
-          </p:cNvPicPr>
-          <p:nvPr/>
-        </p:nvPicPr>
-        <p:blipFill>
-          <a:blip r:embed="rId3">
-            <a:extLst>
-              <a:ext uri="{28A0092B-C50C-407E-A947-70E740481C1C}">
-                <a14:useLocalDpi xmlns:a14="http://schemas.microsoft.com/office/drawing/2010/main" val="0"/>
-              </a:ext>
-            </a:extLst>
-          </a:blip>
-          <a:stretch>
-            <a:fillRect/>
-          </a:stretch>
-        </p:blipFill>
-        <p:spPr>
-          <a:xfrm>
-            <a:off x="0" y="0"/>
-            <a:ext cx="9144000" cy="1076325"/>
-          </a:xfrm>
-          <a:prstGeom prst="rect">
-            <a:avLst/>
-          </a:prstGeom>
-        </p:spPr>
-      </p:pic>
-      <p:sp>
-        <p:nvSpPr>
-          <p:cNvPr id="5" name="TextBox 4"/>
-          <p:cNvSpPr txBox="1"/>
-          <p:nvPr/>
-        </p:nvSpPr>
-        <p:spPr>
-          <a:xfrm>
-            <a:off x="602694" y="202335"/>
-            <a:ext cx="6091069" cy="461665"/>
-          </a:xfrm>
-          <a:prstGeom prst="rect">
-            <a:avLst/>
-          </a:prstGeom>
-          <a:noFill/>
-        </p:spPr>
-        <p:txBody>
-          <a:bodyPr wrap="square" rtlCol="0">
-            <a:spAutoFit/>
-          </a:bodyPr>
-          <a:lstStyle/>
-          <a:p>
-            <a:r>
-              <a:rPr lang="es-CO" sz="2400" b="1" dirty="0">
-                <a:solidFill>
-                  <a:schemeClr val="bg1"/>
-                </a:solidFill>
-                <a:latin typeface="Arial" panose="020B0604020202020204" pitchFamily="34" charset="0"/>
-                <a:cs typeface="Arial" panose="020B0604020202020204" pitchFamily="34" charset="0"/>
-              </a:rPr>
               <a:t>¿Cómo memorizo esto?</a:t>
             </a:r>
           </a:p>
@@ -5124,7 +4912,7 @@
 </p:sld>
 </file>
 
-<file path=ppt/slides/slide15.xml><?xml version="1.0" encoding="utf-8"?>
+<file path=ppt/slides/slide14.xml><?xml version="1.0" encoding="utf-8"?>
 <p:sld xmlns:a="http://schemas.openxmlformats.org/drawingml/2006/main" xmlns:r="http://schemas.openxmlformats.org/officeDocument/2006/relationships" xmlns:p="http://schemas.openxmlformats.org/presentationml/2006/main">
   <p:cSld>
     <p:spTree>
@@ -5490,7 +5278,7 @@
 </p:sld>
 </file>
 
-<file path=ppt/slides/slide16.xml><?xml version="1.0" encoding="utf-8"?>
+<file path=ppt/slides/slide15.xml><?xml version="1.0" encoding="utf-8"?>
 <p:sld xmlns:a="http://schemas.openxmlformats.org/drawingml/2006/main" xmlns:r="http://schemas.openxmlformats.org/officeDocument/2006/relationships" xmlns:p="http://schemas.openxmlformats.org/presentationml/2006/main">
   <p:cSld>
     <p:spTree>
@@ -5675,6 +5463,415 @@
     <p:extLst>
       <p:ext uri="{BB962C8B-B14F-4D97-AF65-F5344CB8AC3E}">
         <p14:creationId xmlns:p14="http://schemas.microsoft.com/office/powerpoint/2010/main" val="632335764"/>
+      </p:ext>
+    </p:extLst>
+  </p:cSld>
+  <p:clrMapOvr>
+    <a:masterClrMapping/>
+  </p:clrMapOvr>
+</p:sld>
+</file>
+
+<file path=ppt/slides/slide16.xml><?xml version="1.0" encoding="utf-8"?>
+<p:sld xmlns:a="http://schemas.openxmlformats.org/drawingml/2006/main" xmlns:r="http://schemas.openxmlformats.org/officeDocument/2006/relationships" xmlns:p="http://schemas.openxmlformats.org/presentationml/2006/main">
+  <p:cSld>
+    <p:spTree>
+      <p:nvGrpSpPr>
+        <p:cNvPr id="1" name=""/>
+        <p:cNvGrpSpPr/>
+        <p:nvPr/>
+      </p:nvGrpSpPr>
+      <p:grpSpPr>
+        <a:xfrm>
+          <a:off x="0" y="0"/>
+          <a:ext cx="0" cy="0"/>
+          <a:chOff x="0" y="0"/>
+          <a:chExt cx="0" cy="0"/>
+        </a:xfrm>
+      </p:grpSpPr>
+      <p:pic>
+        <p:nvPicPr>
+          <p:cNvPr id="2" name="Picture 1"/>
+          <p:cNvPicPr>
+            <a:picLocks noChangeAspect="1"/>
+          </p:cNvPicPr>
+          <p:nvPr/>
+        </p:nvPicPr>
+        <p:blipFill>
+          <a:blip r:embed="rId3">
+            <a:extLst>
+              <a:ext uri="{28A0092B-C50C-407E-A947-70E740481C1C}">
+                <a14:useLocalDpi xmlns:a14="http://schemas.microsoft.com/office/drawing/2010/main" val="0"/>
+              </a:ext>
+            </a:extLst>
+          </a:blip>
+          <a:stretch>
+            <a:fillRect/>
+          </a:stretch>
+        </p:blipFill>
+        <p:spPr>
+          <a:xfrm>
+            <a:off x="0" y="-14731"/>
+            <a:ext cx="9144000" cy="1076325"/>
+          </a:xfrm>
+          <a:prstGeom prst="rect">
+            <a:avLst/>
+          </a:prstGeom>
+        </p:spPr>
+      </p:pic>
+      <p:sp>
+        <p:nvSpPr>
+          <p:cNvPr id="5" name="TextBox 4"/>
+          <p:cNvSpPr txBox="1"/>
+          <p:nvPr/>
+        </p:nvSpPr>
+        <p:spPr>
+          <a:xfrm>
+            <a:off x="602694" y="202335"/>
+            <a:ext cx="6091069" cy="461665"/>
+          </a:xfrm>
+          <a:prstGeom prst="rect">
+            <a:avLst/>
+          </a:prstGeom>
+          <a:noFill/>
+        </p:spPr>
+        <p:txBody>
+          <a:bodyPr wrap="square" rtlCol="0">
+            <a:spAutoFit/>
+          </a:bodyPr>
+          <a:lstStyle/>
+          <a:p>
+            <a:r>
+              <a:rPr lang="es-CO" sz="2400" b="1" dirty="0" err="1">
+                <a:solidFill>
+                  <a:schemeClr val="bg1"/>
+                </a:solidFill>
+                <a:latin typeface="Arial" panose="020B0604020202020204" pitchFamily="34" charset="0"/>
+                <a:cs typeface="Arial" panose="020B0604020202020204" pitchFamily="34" charset="0"/>
+              </a:rPr>
+              <a:t>Knapsack</a:t>
+            </a:r>
+            <a:endParaRPr lang="es-CO" sz="2400" b="1" dirty="0">
+              <a:solidFill>
+                <a:schemeClr val="bg1"/>
+              </a:solidFill>
+              <a:latin typeface="Arial" panose="020B0604020202020204" pitchFamily="34" charset="0"/>
+              <a:cs typeface="Arial" panose="020B0604020202020204" pitchFamily="34" charset="0"/>
+            </a:endParaRPr>
+          </a:p>
+        </p:txBody>
+      </p:sp>
+      <p:sp>
+        <p:nvSpPr>
+          <p:cNvPr id="4" name="TextBox 3">
+            <a:extLst>
+              <a:ext uri="{FF2B5EF4-FFF2-40B4-BE49-F238E27FC236}">
+                <a16:creationId xmlns:a16="http://schemas.microsoft.com/office/drawing/2014/main" id="{EC1A5C25-63BD-4EDC-9DD7-EFAD366D565E}"/>
+              </a:ext>
+            </a:extLst>
+          </p:cNvPr>
+          <p:cNvSpPr txBox="1"/>
+          <p:nvPr/>
+        </p:nvSpPr>
+        <p:spPr>
+          <a:xfrm>
+            <a:off x="710214" y="1695635"/>
+            <a:ext cx="4328044" cy="523220"/>
+          </a:xfrm>
+          <a:prstGeom prst="rect">
+            <a:avLst/>
+          </a:prstGeom>
+          <a:noFill/>
+        </p:spPr>
+        <p:txBody>
+          <a:bodyPr wrap="none" rtlCol="0">
+            <a:spAutoFit/>
+          </a:bodyPr>
+          <a:lstStyle/>
+          <a:p>
+            <a:r>
+              <a:rPr lang="en-GB" sz="2800" dirty="0"/>
+              <a:t>¿</a:t>
+            </a:r>
+            <a:r>
+              <a:rPr lang="en-GB" sz="2800" dirty="0" err="1"/>
+              <a:t>Cuáles</a:t>
+            </a:r>
+            <a:r>
+              <a:rPr lang="en-GB" sz="2800" dirty="0"/>
+              <a:t> son el (los) </a:t>
+            </a:r>
+            <a:r>
+              <a:rPr lang="en-GB" sz="2800" dirty="0" err="1"/>
+              <a:t>estados</a:t>
+            </a:r>
+            <a:r>
+              <a:rPr lang="en-GB" sz="2800" dirty="0"/>
+              <a:t>?</a:t>
+            </a:r>
+          </a:p>
+        </p:txBody>
+      </p:sp>
+      <p:sp>
+        <p:nvSpPr>
+          <p:cNvPr id="7" name="TextBox 6">
+            <a:extLst>
+              <a:ext uri="{FF2B5EF4-FFF2-40B4-BE49-F238E27FC236}">
+                <a16:creationId xmlns:a16="http://schemas.microsoft.com/office/drawing/2014/main" id="{06C87A72-F59B-4DA0-9534-E8C0AF6AD0C9}"/>
+              </a:ext>
+            </a:extLst>
+          </p:cNvPr>
+          <p:cNvSpPr txBox="1"/>
+          <p:nvPr/>
+        </p:nvSpPr>
+        <p:spPr>
+          <a:xfrm>
+            <a:off x="2286000" y="3246553"/>
+            <a:ext cx="4572000" cy="369332"/>
+          </a:xfrm>
+          <a:prstGeom prst="rect">
+            <a:avLst/>
+          </a:prstGeom>
+          <a:noFill/>
+        </p:spPr>
+        <p:txBody>
+          <a:bodyPr wrap="square">
+            <a:spAutoFit/>
+          </a:bodyPr>
+          <a:lstStyle/>
+          <a:p>
+            <a:r>
+              <a:rPr lang="es-CO" sz="1800" b="1" dirty="0">
+                <a:solidFill>
+                  <a:schemeClr val="bg1"/>
+                </a:solidFill>
+                <a:latin typeface="Arial" panose="020B0604020202020204" pitchFamily="34" charset="0"/>
+                <a:cs typeface="Arial" panose="020B0604020202020204" pitchFamily="34" charset="0"/>
+              </a:rPr>
+              <a:t>Conteo de subconjuntos</a:t>
+            </a:r>
+          </a:p>
+        </p:txBody>
+      </p:sp>
+      <p:sp>
+        <p:nvSpPr>
+          <p:cNvPr id="3" name="TextBox 2">
+            <a:extLst>
+              <a:ext uri="{FF2B5EF4-FFF2-40B4-BE49-F238E27FC236}">
+                <a16:creationId xmlns:a16="http://schemas.microsoft.com/office/drawing/2014/main" id="{3D24E1FB-308F-487E-8A43-2F68C98BADD1}"/>
+              </a:ext>
+            </a:extLst>
+          </p:cNvPr>
+          <p:cNvSpPr txBox="1"/>
+          <p:nvPr/>
+        </p:nvSpPr>
+        <p:spPr>
+          <a:xfrm>
+            <a:off x="857100" y="2535512"/>
+            <a:ext cx="4432688" cy="954107"/>
+          </a:xfrm>
+          <a:prstGeom prst="rect">
+            <a:avLst/>
+          </a:prstGeom>
+          <a:noFill/>
+        </p:spPr>
+        <p:txBody>
+          <a:bodyPr wrap="none" rtlCol="0">
+            <a:spAutoFit/>
+          </a:bodyPr>
+          <a:lstStyle/>
+          <a:p>
+            <a:pPr marL="457200" indent="-457200">
+              <a:buFont typeface="Arial" panose="020B0604020202020204" pitchFamily="34" charset="0"/>
+              <a:buChar char="•"/>
+            </a:pPr>
+            <a:r>
+              <a:rPr lang="en-GB" sz="2800" dirty="0"/>
+              <a:t>El </a:t>
+            </a:r>
+            <a:r>
+              <a:rPr lang="en-GB" sz="2800" dirty="0" err="1"/>
+              <a:t>artículo</a:t>
+            </a:r>
+            <a:r>
+              <a:rPr lang="en-GB" sz="2800" dirty="0"/>
+              <a:t> </a:t>
+            </a:r>
+            <a:r>
+              <a:rPr lang="en-GB" sz="2800" dirty="0" err="1"/>
+              <a:t>i</a:t>
+            </a:r>
+            <a:endParaRPr lang="en-GB" sz="2800" dirty="0"/>
+          </a:p>
+          <a:p>
+            <a:pPr marL="457200" indent="-457200">
+              <a:buFont typeface="Arial" panose="020B0604020202020204" pitchFamily="34" charset="0"/>
+              <a:buChar char="•"/>
+            </a:pPr>
+            <a:r>
+              <a:rPr lang="en-GB" sz="2800" dirty="0"/>
+              <a:t>El peso libre </a:t>
+            </a:r>
+            <a:r>
+              <a:rPr lang="en-GB" sz="2800" dirty="0" err="1"/>
+              <a:t>en</a:t>
+            </a:r>
+            <a:r>
+              <a:rPr lang="en-GB" sz="2800" dirty="0"/>
+              <a:t> la mochila</a:t>
+            </a:r>
+          </a:p>
+        </p:txBody>
+      </p:sp>
+      <p:sp>
+        <p:nvSpPr>
+          <p:cNvPr id="6" name="TextBox 5">
+            <a:extLst>
+              <a:ext uri="{FF2B5EF4-FFF2-40B4-BE49-F238E27FC236}">
+                <a16:creationId xmlns:a16="http://schemas.microsoft.com/office/drawing/2014/main" id="{78260DA1-C491-476A-8449-A9F7C0F7379B}"/>
+              </a:ext>
+            </a:extLst>
+          </p:cNvPr>
+          <p:cNvSpPr txBox="1"/>
+          <p:nvPr/>
+        </p:nvSpPr>
+        <p:spPr>
+          <a:xfrm>
+            <a:off x="611084" y="4123660"/>
+            <a:ext cx="4196085" cy="523220"/>
+          </a:xfrm>
+          <a:prstGeom prst="rect">
+            <a:avLst/>
+          </a:prstGeom>
+          <a:noFill/>
+        </p:spPr>
+        <p:txBody>
+          <a:bodyPr wrap="none" rtlCol="0">
+            <a:spAutoFit/>
+          </a:bodyPr>
+          <a:lstStyle/>
+          <a:p>
+            <a:r>
+              <a:rPr lang="en-GB" sz="2800" dirty="0"/>
+              <a:t>¿Con </a:t>
+            </a:r>
+            <a:r>
+              <a:rPr lang="en-GB" sz="2800" dirty="0" err="1"/>
+              <a:t>qué</a:t>
+            </a:r>
+            <a:r>
+              <a:rPr lang="en-GB" sz="2800" dirty="0"/>
+              <a:t> variables </a:t>
+            </a:r>
+            <a:r>
+              <a:rPr lang="en-GB" sz="2800" dirty="0" err="1"/>
+              <a:t>cuento</a:t>
+            </a:r>
+            <a:r>
+              <a:rPr lang="en-GB" sz="2800" dirty="0"/>
+              <a:t>?</a:t>
+            </a:r>
+          </a:p>
+        </p:txBody>
+      </p:sp>
+      <p:sp>
+        <p:nvSpPr>
+          <p:cNvPr id="10" name="TextBox 9">
+            <a:extLst>
+              <a:ext uri="{FF2B5EF4-FFF2-40B4-BE49-F238E27FC236}">
+                <a16:creationId xmlns:a16="http://schemas.microsoft.com/office/drawing/2014/main" id="{E63055B9-97AE-4BBA-9BF1-579006E71C13}"/>
+              </a:ext>
+            </a:extLst>
+          </p:cNvPr>
+          <p:cNvSpPr txBox="1"/>
+          <p:nvPr/>
+        </p:nvSpPr>
+        <p:spPr>
+          <a:xfrm>
+            <a:off x="638900" y="4775781"/>
+            <a:ext cx="8024809" cy="954107"/>
+          </a:xfrm>
+          <a:prstGeom prst="rect">
+            <a:avLst/>
+          </a:prstGeom>
+          <a:noFill/>
+        </p:spPr>
+        <p:txBody>
+          <a:bodyPr wrap="square" rtlCol="0">
+            <a:spAutoFit/>
+          </a:bodyPr>
+          <a:lstStyle/>
+          <a:p>
+            <a:pPr marL="457200" marR="0" lvl="0" indent="-457200" algn="l" defTabSz="914400" rtl="0" eaLnBrk="0" fontAlgn="base" latinLnBrk="0" hangingPunct="0">
+              <a:lnSpc>
+                <a:spcPct val="100000"/>
+              </a:lnSpc>
+              <a:spcBef>
+                <a:spcPct val="0"/>
+              </a:spcBef>
+              <a:spcAft>
+                <a:spcPct val="0"/>
+              </a:spcAft>
+              <a:buClrTx/>
+              <a:buSzTx/>
+              <a:buFont typeface="Arial" panose="020B0604020202020204" pitchFamily="34" charset="0"/>
+              <a:buChar char="•"/>
+              <a:tabLst/>
+            </a:pPr>
+            <a:r>
+              <a:rPr lang="en-GB" sz="2800" dirty="0"/>
+              <a:t>W[n] =&gt; Pesos de los n </a:t>
+            </a:r>
+            <a:r>
+              <a:rPr lang="en-GB" sz="2800" dirty="0" err="1"/>
+              <a:t>productos</a:t>
+            </a:r>
+            <a:endParaRPr lang="en-GB" sz="2800" dirty="0"/>
+          </a:p>
+          <a:p>
+            <a:pPr marL="457200" marR="0" lvl="0" indent="-457200" algn="l" defTabSz="914400" rtl="0" eaLnBrk="0" fontAlgn="base" latinLnBrk="0" hangingPunct="0">
+              <a:lnSpc>
+                <a:spcPct val="100000"/>
+              </a:lnSpc>
+              <a:spcBef>
+                <a:spcPct val="0"/>
+              </a:spcBef>
+              <a:spcAft>
+                <a:spcPct val="0"/>
+              </a:spcAft>
+              <a:buClrTx/>
+              <a:buSzTx/>
+              <a:buFont typeface="Arial" panose="020B0604020202020204" pitchFamily="34" charset="0"/>
+              <a:buChar char="•"/>
+              <a:tabLst/>
+            </a:pPr>
+            <a:r>
+              <a:rPr lang="en-GB" sz="2800" dirty="0"/>
+              <a:t>P[n] =&gt; </a:t>
+            </a:r>
+            <a:r>
+              <a:rPr lang="en-GB" sz="2800" dirty="0" err="1"/>
+              <a:t>Valor</a:t>
+            </a:r>
+            <a:r>
+              <a:rPr lang="en-GB" sz="2800" dirty="0"/>
+              <a:t> de los n </a:t>
+            </a:r>
+            <a:r>
+              <a:rPr lang="en-GB" sz="2800" dirty="0" err="1"/>
+              <a:t>productos</a:t>
+            </a:r>
+            <a:r>
+              <a:rPr lang="en-GB" sz="2800" dirty="0"/>
+              <a:t> </a:t>
+            </a:r>
+          </a:p>
+        </p:txBody>
+      </p:sp>
+    </p:spTree>
+    <p:extLst>
+      <p:ext uri="{BB962C8B-B14F-4D97-AF65-F5344CB8AC3E}">
+        <p14:creationId xmlns:p14="http://schemas.microsoft.com/office/powerpoint/2010/main" val="2257809930"/>
       </p:ext>
     </p:extLst>
   </p:cSld>
@@ -5723,415 +5920,6 @@
         </p:blipFill>
         <p:spPr>
           <a:xfrm>
-            <a:off x="0" y="-14731"/>
-            <a:ext cx="9144000" cy="1076325"/>
-          </a:xfrm>
-          <a:prstGeom prst="rect">
-            <a:avLst/>
-          </a:prstGeom>
-        </p:spPr>
-      </p:pic>
-      <p:sp>
-        <p:nvSpPr>
-          <p:cNvPr id="5" name="TextBox 4"/>
-          <p:cNvSpPr txBox="1"/>
-          <p:nvPr/>
-        </p:nvSpPr>
-        <p:spPr>
-          <a:xfrm>
-            <a:off x="602694" y="202335"/>
-            <a:ext cx="6091069" cy="461665"/>
-          </a:xfrm>
-          <a:prstGeom prst="rect">
-            <a:avLst/>
-          </a:prstGeom>
-          <a:noFill/>
-        </p:spPr>
-        <p:txBody>
-          <a:bodyPr wrap="square" rtlCol="0">
-            <a:spAutoFit/>
-          </a:bodyPr>
-          <a:lstStyle/>
-          <a:p>
-            <a:r>
-              <a:rPr lang="es-CO" sz="2400" b="1" dirty="0" err="1">
-                <a:solidFill>
-                  <a:schemeClr val="bg1"/>
-                </a:solidFill>
-                <a:latin typeface="Arial" panose="020B0604020202020204" pitchFamily="34" charset="0"/>
-                <a:cs typeface="Arial" panose="020B0604020202020204" pitchFamily="34" charset="0"/>
-              </a:rPr>
-              <a:t>Knapsack</a:t>
-            </a:r>
-            <a:endParaRPr lang="es-CO" sz="2400" b="1" dirty="0">
-              <a:solidFill>
-                <a:schemeClr val="bg1"/>
-              </a:solidFill>
-              <a:latin typeface="Arial" panose="020B0604020202020204" pitchFamily="34" charset="0"/>
-              <a:cs typeface="Arial" panose="020B0604020202020204" pitchFamily="34" charset="0"/>
-            </a:endParaRPr>
-          </a:p>
-        </p:txBody>
-      </p:sp>
-      <p:sp>
-        <p:nvSpPr>
-          <p:cNvPr id="4" name="TextBox 3">
-            <a:extLst>
-              <a:ext uri="{FF2B5EF4-FFF2-40B4-BE49-F238E27FC236}">
-                <a16:creationId xmlns:a16="http://schemas.microsoft.com/office/drawing/2014/main" id="{EC1A5C25-63BD-4EDC-9DD7-EFAD366D565E}"/>
-              </a:ext>
-            </a:extLst>
-          </p:cNvPr>
-          <p:cNvSpPr txBox="1"/>
-          <p:nvPr/>
-        </p:nvSpPr>
-        <p:spPr>
-          <a:xfrm>
-            <a:off x="710214" y="1695635"/>
-            <a:ext cx="4328044" cy="523220"/>
-          </a:xfrm>
-          <a:prstGeom prst="rect">
-            <a:avLst/>
-          </a:prstGeom>
-          <a:noFill/>
-        </p:spPr>
-        <p:txBody>
-          <a:bodyPr wrap="none" rtlCol="0">
-            <a:spAutoFit/>
-          </a:bodyPr>
-          <a:lstStyle/>
-          <a:p>
-            <a:r>
-              <a:rPr lang="en-GB" sz="2800" dirty="0"/>
-              <a:t>¿</a:t>
-            </a:r>
-            <a:r>
-              <a:rPr lang="en-GB" sz="2800" dirty="0" err="1"/>
-              <a:t>Cuáles</a:t>
-            </a:r>
-            <a:r>
-              <a:rPr lang="en-GB" sz="2800" dirty="0"/>
-              <a:t> son el (los) </a:t>
-            </a:r>
-            <a:r>
-              <a:rPr lang="en-GB" sz="2800" dirty="0" err="1"/>
-              <a:t>estados</a:t>
-            </a:r>
-            <a:r>
-              <a:rPr lang="en-GB" sz="2800" dirty="0"/>
-              <a:t>?</a:t>
-            </a:r>
-          </a:p>
-        </p:txBody>
-      </p:sp>
-      <p:sp>
-        <p:nvSpPr>
-          <p:cNvPr id="7" name="TextBox 6">
-            <a:extLst>
-              <a:ext uri="{FF2B5EF4-FFF2-40B4-BE49-F238E27FC236}">
-                <a16:creationId xmlns:a16="http://schemas.microsoft.com/office/drawing/2014/main" id="{06C87A72-F59B-4DA0-9534-E8C0AF6AD0C9}"/>
-              </a:ext>
-            </a:extLst>
-          </p:cNvPr>
-          <p:cNvSpPr txBox="1"/>
-          <p:nvPr/>
-        </p:nvSpPr>
-        <p:spPr>
-          <a:xfrm>
-            <a:off x="2286000" y="3246553"/>
-            <a:ext cx="4572000" cy="369332"/>
-          </a:xfrm>
-          <a:prstGeom prst="rect">
-            <a:avLst/>
-          </a:prstGeom>
-          <a:noFill/>
-        </p:spPr>
-        <p:txBody>
-          <a:bodyPr wrap="square">
-            <a:spAutoFit/>
-          </a:bodyPr>
-          <a:lstStyle/>
-          <a:p>
-            <a:r>
-              <a:rPr lang="es-CO" sz="1800" b="1" dirty="0">
-                <a:solidFill>
-                  <a:schemeClr val="bg1"/>
-                </a:solidFill>
-                <a:latin typeface="Arial" panose="020B0604020202020204" pitchFamily="34" charset="0"/>
-                <a:cs typeface="Arial" panose="020B0604020202020204" pitchFamily="34" charset="0"/>
-              </a:rPr>
-              <a:t>Conteo de subconjuntos</a:t>
-            </a:r>
-          </a:p>
-        </p:txBody>
-      </p:sp>
-      <p:sp>
-        <p:nvSpPr>
-          <p:cNvPr id="3" name="TextBox 2">
-            <a:extLst>
-              <a:ext uri="{FF2B5EF4-FFF2-40B4-BE49-F238E27FC236}">
-                <a16:creationId xmlns:a16="http://schemas.microsoft.com/office/drawing/2014/main" id="{3D24E1FB-308F-487E-8A43-2F68C98BADD1}"/>
-              </a:ext>
-            </a:extLst>
-          </p:cNvPr>
-          <p:cNvSpPr txBox="1"/>
-          <p:nvPr/>
-        </p:nvSpPr>
-        <p:spPr>
-          <a:xfrm>
-            <a:off x="857100" y="2535512"/>
-            <a:ext cx="4432688" cy="954107"/>
-          </a:xfrm>
-          <a:prstGeom prst="rect">
-            <a:avLst/>
-          </a:prstGeom>
-          <a:noFill/>
-        </p:spPr>
-        <p:txBody>
-          <a:bodyPr wrap="none" rtlCol="0">
-            <a:spAutoFit/>
-          </a:bodyPr>
-          <a:lstStyle/>
-          <a:p>
-            <a:pPr marL="457200" indent="-457200">
-              <a:buFont typeface="Arial" panose="020B0604020202020204" pitchFamily="34" charset="0"/>
-              <a:buChar char="•"/>
-            </a:pPr>
-            <a:r>
-              <a:rPr lang="en-GB" sz="2800" dirty="0"/>
-              <a:t>El </a:t>
-            </a:r>
-            <a:r>
-              <a:rPr lang="en-GB" sz="2800" dirty="0" err="1"/>
-              <a:t>artículo</a:t>
-            </a:r>
-            <a:r>
-              <a:rPr lang="en-GB" sz="2800" dirty="0"/>
-              <a:t> </a:t>
-            </a:r>
-            <a:r>
-              <a:rPr lang="en-GB" sz="2800" dirty="0" err="1"/>
-              <a:t>i</a:t>
-            </a:r>
-            <a:endParaRPr lang="en-GB" sz="2800" dirty="0"/>
-          </a:p>
-          <a:p>
-            <a:pPr marL="457200" indent="-457200">
-              <a:buFont typeface="Arial" panose="020B0604020202020204" pitchFamily="34" charset="0"/>
-              <a:buChar char="•"/>
-            </a:pPr>
-            <a:r>
-              <a:rPr lang="en-GB" sz="2800" dirty="0"/>
-              <a:t>El peso libre </a:t>
-            </a:r>
-            <a:r>
-              <a:rPr lang="en-GB" sz="2800" dirty="0" err="1"/>
-              <a:t>en</a:t>
-            </a:r>
-            <a:r>
-              <a:rPr lang="en-GB" sz="2800" dirty="0"/>
-              <a:t> la mochila</a:t>
-            </a:r>
-          </a:p>
-        </p:txBody>
-      </p:sp>
-      <p:sp>
-        <p:nvSpPr>
-          <p:cNvPr id="6" name="TextBox 5">
-            <a:extLst>
-              <a:ext uri="{FF2B5EF4-FFF2-40B4-BE49-F238E27FC236}">
-                <a16:creationId xmlns:a16="http://schemas.microsoft.com/office/drawing/2014/main" id="{78260DA1-C491-476A-8449-A9F7C0F7379B}"/>
-              </a:ext>
-            </a:extLst>
-          </p:cNvPr>
-          <p:cNvSpPr txBox="1"/>
-          <p:nvPr/>
-        </p:nvSpPr>
-        <p:spPr>
-          <a:xfrm>
-            <a:off x="611084" y="4123660"/>
-            <a:ext cx="4196085" cy="523220"/>
-          </a:xfrm>
-          <a:prstGeom prst="rect">
-            <a:avLst/>
-          </a:prstGeom>
-          <a:noFill/>
-        </p:spPr>
-        <p:txBody>
-          <a:bodyPr wrap="none" rtlCol="0">
-            <a:spAutoFit/>
-          </a:bodyPr>
-          <a:lstStyle/>
-          <a:p>
-            <a:r>
-              <a:rPr lang="en-GB" sz="2800" dirty="0"/>
-              <a:t>¿Con </a:t>
-            </a:r>
-            <a:r>
-              <a:rPr lang="en-GB" sz="2800" dirty="0" err="1"/>
-              <a:t>qué</a:t>
-            </a:r>
-            <a:r>
-              <a:rPr lang="en-GB" sz="2800" dirty="0"/>
-              <a:t> variables </a:t>
-            </a:r>
-            <a:r>
-              <a:rPr lang="en-GB" sz="2800" dirty="0" err="1"/>
-              <a:t>cuento</a:t>
-            </a:r>
-            <a:r>
-              <a:rPr lang="en-GB" sz="2800" dirty="0"/>
-              <a:t>?</a:t>
-            </a:r>
-          </a:p>
-        </p:txBody>
-      </p:sp>
-      <p:sp>
-        <p:nvSpPr>
-          <p:cNvPr id="10" name="TextBox 9">
-            <a:extLst>
-              <a:ext uri="{FF2B5EF4-FFF2-40B4-BE49-F238E27FC236}">
-                <a16:creationId xmlns:a16="http://schemas.microsoft.com/office/drawing/2014/main" id="{E63055B9-97AE-4BBA-9BF1-579006E71C13}"/>
-              </a:ext>
-            </a:extLst>
-          </p:cNvPr>
-          <p:cNvSpPr txBox="1"/>
-          <p:nvPr/>
-        </p:nvSpPr>
-        <p:spPr>
-          <a:xfrm>
-            <a:off x="638900" y="4775781"/>
-            <a:ext cx="8024809" cy="954107"/>
-          </a:xfrm>
-          <a:prstGeom prst="rect">
-            <a:avLst/>
-          </a:prstGeom>
-          <a:noFill/>
-        </p:spPr>
-        <p:txBody>
-          <a:bodyPr wrap="square" rtlCol="0">
-            <a:spAutoFit/>
-          </a:bodyPr>
-          <a:lstStyle/>
-          <a:p>
-            <a:pPr marL="457200" marR="0" lvl="0" indent="-457200" algn="l" defTabSz="914400" rtl="0" eaLnBrk="0" fontAlgn="base" latinLnBrk="0" hangingPunct="0">
-              <a:lnSpc>
-                <a:spcPct val="100000"/>
-              </a:lnSpc>
-              <a:spcBef>
-                <a:spcPct val="0"/>
-              </a:spcBef>
-              <a:spcAft>
-                <a:spcPct val="0"/>
-              </a:spcAft>
-              <a:buClrTx/>
-              <a:buSzTx/>
-              <a:buFont typeface="Arial" panose="020B0604020202020204" pitchFamily="34" charset="0"/>
-              <a:buChar char="•"/>
-              <a:tabLst/>
-            </a:pPr>
-            <a:r>
-              <a:rPr lang="en-GB" sz="2800" dirty="0"/>
-              <a:t>W[n] =&gt; Pesos de los n </a:t>
-            </a:r>
-            <a:r>
-              <a:rPr lang="en-GB" sz="2800" dirty="0" err="1"/>
-              <a:t>productos</a:t>
-            </a:r>
-            <a:endParaRPr lang="en-GB" sz="2800" dirty="0"/>
-          </a:p>
-          <a:p>
-            <a:pPr marL="457200" marR="0" lvl="0" indent="-457200" algn="l" defTabSz="914400" rtl="0" eaLnBrk="0" fontAlgn="base" latinLnBrk="0" hangingPunct="0">
-              <a:lnSpc>
-                <a:spcPct val="100000"/>
-              </a:lnSpc>
-              <a:spcBef>
-                <a:spcPct val="0"/>
-              </a:spcBef>
-              <a:spcAft>
-                <a:spcPct val="0"/>
-              </a:spcAft>
-              <a:buClrTx/>
-              <a:buSzTx/>
-              <a:buFont typeface="Arial" panose="020B0604020202020204" pitchFamily="34" charset="0"/>
-              <a:buChar char="•"/>
-              <a:tabLst/>
-            </a:pPr>
-            <a:r>
-              <a:rPr lang="en-GB" sz="2800" dirty="0"/>
-              <a:t>P[n] =&gt; </a:t>
-            </a:r>
-            <a:r>
-              <a:rPr lang="en-GB" sz="2800" dirty="0" err="1"/>
-              <a:t>Valor</a:t>
-            </a:r>
-            <a:r>
-              <a:rPr lang="en-GB" sz="2800" dirty="0"/>
-              <a:t> de los n </a:t>
-            </a:r>
-            <a:r>
-              <a:rPr lang="en-GB" sz="2800" dirty="0" err="1"/>
-              <a:t>productos</a:t>
-            </a:r>
-            <a:r>
-              <a:rPr lang="en-GB" sz="2800" dirty="0"/>
-              <a:t> </a:t>
-            </a:r>
-          </a:p>
-        </p:txBody>
-      </p:sp>
-    </p:spTree>
-    <p:extLst>
-      <p:ext uri="{BB962C8B-B14F-4D97-AF65-F5344CB8AC3E}">
-        <p14:creationId xmlns:p14="http://schemas.microsoft.com/office/powerpoint/2010/main" val="2257809930"/>
-      </p:ext>
-    </p:extLst>
-  </p:cSld>
-  <p:clrMapOvr>
-    <a:masterClrMapping/>
-  </p:clrMapOvr>
-</p:sld>
-</file>
-
-<file path=ppt/slides/slide18.xml><?xml version="1.0" encoding="utf-8"?>
-<p:sld xmlns:a="http://schemas.openxmlformats.org/drawingml/2006/main" xmlns:r="http://schemas.openxmlformats.org/officeDocument/2006/relationships" xmlns:p="http://schemas.openxmlformats.org/presentationml/2006/main">
-  <p:cSld>
-    <p:spTree>
-      <p:nvGrpSpPr>
-        <p:cNvPr id="1" name=""/>
-        <p:cNvGrpSpPr/>
-        <p:nvPr/>
-      </p:nvGrpSpPr>
-      <p:grpSpPr>
-        <a:xfrm>
-          <a:off x="0" y="0"/>
-          <a:ext cx="0" cy="0"/>
-          <a:chOff x="0" y="0"/>
-          <a:chExt cx="0" cy="0"/>
-        </a:xfrm>
-      </p:grpSpPr>
-      <p:pic>
-        <p:nvPicPr>
-          <p:cNvPr id="2" name="Picture 1"/>
-          <p:cNvPicPr>
-            <a:picLocks noChangeAspect="1"/>
-          </p:cNvPicPr>
-          <p:nvPr/>
-        </p:nvPicPr>
-        <p:blipFill>
-          <a:blip r:embed="rId3">
-            <a:extLst>
-              <a:ext uri="{28A0092B-C50C-407E-A947-70E740481C1C}">
-                <a14:useLocalDpi xmlns:a14="http://schemas.microsoft.com/office/drawing/2010/main" val="0"/>
-              </a:ext>
-            </a:extLst>
-          </a:blip>
-          <a:stretch>
-            <a:fillRect/>
-          </a:stretch>
-        </p:blipFill>
-        <p:spPr>
-          <a:xfrm>
             <a:off x="0" y="0"/>
             <a:ext cx="9144000" cy="1076325"/>
           </a:xfrm>
@@ -6377,6 +6165,265 @@
 </p:sld>
 </file>
 
+<file path=ppt/slides/slide18.xml><?xml version="1.0" encoding="utf-8"?>
+<p:sld xmlns:a="http://schemas.openxmlformats.org/drawingml/2006/main" xmlns:r="http://schemas.openxmlformats.org/officeDocument/2006/relationships" xmlns:p="http://schemas.openxmlformats.org/presentationml/2006/main">
+  <p:cSld>
+    <p:spTree>
+      <p:nvGrpSpPr>
+        <p:cNvPr id="1" name=""/>
+        <p:cNvGrpSpPr/>
+        <p:nvPr/>
+      </p:nvGrpSpPr>
+      <p:grpSpPr>
+        <a:xfrm>
+          <a:off x="0" y="0"/>
+          <a:ext cx="0" cy="0"/>
+          <a:chOff x="0" y="0"/>
+          <a:chExt cx="0" cy="0"/>
+        </a:xfrm>
+      </p:grpSpPr>
+      <p:sp>
+        <p:nvSpPr>
+          <p:cNvPr id="2" name="Title 1">
+            <a:extLst>
+              <a:ext uri="{FF2B5EF4-FFF2-40B4-BE49-F238E27FC236}">
+                <a16:creationId xmlns:a16="http://schemas.microsoft.com/office/drawing/2014/main" id="{FE15285C-C8F4-4C93-935E-B607342419B7}"/>
+              </a:ext>
+            </a:extLst>
+          </p:cNvPr>
+          <p:cNvSpPr>
+            <a:spLocks noGrp="1"/>
+          </p:cNvSpPr>
+          <p:nvPr>
+            <p:ph type="title"/>
+          </p:nvPr>
+        </p:nvSpPr>
+        <p:spPr/>
+        <p:txBody>
+          <a:bodyPr/>
+          <a:lstStyle/>
+          <a:p>
+            <a:r>
+              <a:rPr lang="en-GB" dirty="0"/>
+              <a:t>Coin change</a:t>
+            </a:r>
+          </a:p>
+        </p:txBody>
+      </p:sp>
+      <p:sp>
+        <p:nvSpPr>
+          <p:cNvPr id="3" name="Content Placeholder 2">
+            <a:extLst>
+              <a:ext uri="{FF2B5EF4-FFF2-40B4-BE49-F238E27FC236}">
+                <a16:creationId xmlns:a16="http://schemas.microsoft.com/office/drawing/2014/main" id="{6D3CB94B-BDC3-40E0-B966-05A4C653F66C}"/>
+              </a:ext>
+            </a:extLst>
+          </p:cNvPr>
+          <p:cNvSpPr>
+            <a:spLocks noGrp="1"/>
+          </p:cNvSpPr>
+          <p:nvPr>
+            <p:ph idx="1"/>
+          </p:nvPr>
+        </p:nvSpPr>
+        <p:spPr/>
+        <p:txBody>
+          <a:bodyPr/>
+          <a:lstStyle/>
+          <a:p>
+            <a:r>
+              <a:rPr lang="en-GB" dirty="0" err="1"/>
+              <a:t>Problema</a:t>
+            </a:r>
+            <a:r>
+              <a:rPr lang="en-GB" dirty="0"/>
+              <a:t> del </a:t>
+            </a:r>
+            <a:r>
+              <a:rPr lang="en-GB" dirty="0" err="1"/>
+              <a:t>cambio</a:t>
+            </a:r>
+            <a:r>
+              <a:rPr lang="en-GB" dirty="0"/>
+              <a:t> de </a:t>
+            </a:r>
+            <a:r>
+              <a:rPr lang="en-GB" dirty="0" err="1"/>
+              <a:t>moneda</a:t>
+            </a:r>
+            <a:r>
+              <a:rPr lang="en-GB" dirty="0"/>
+              <a:t>.</a:t>
+            </a:r>
+          </a:p>
+          <a:p>
+            <a:r>
+              <a:rPr lang="en-GB" dirty="0"/>
+              <a:t>Se </a:t>
+            </a:r>
+            <a:r>
+              <a:rPr lang="en-GB" dirty="0" err="1"/>
+              <a:t>tiene</a:t>
+            </a:r>
+            <a:r>
+              <a:rPr lang="en-GB" dirty="0"/>
+              <a:t> un </a:t>
+            </a:r>
+            <a:r>
+              <a:rPr lang="en-GB" dirty="0" err="1"/>
+              <a:t>arreglo</a:t>
+            </a:r>
+            <a:r>
+              <a:rPr lang="en-GB" dirty="0"/>
+              <a:t> de </a:t>
+            </a:r>
+            <a:r>
+              <a:rPr lang="en-GB" dirty="0" err="1"/>
+              <a:t>monedas</a:t>
+            </a:r>
+            <a:r>
+              <a:rPr lang="en-GB" dirty="0"/>
+              <a:t>:</a:t>
+            </a:r>
+          </a:p>
+          <a:p>
+            <a:pPr marL="0" indent="0">
+              <a:buNone/>
+            </a:pPr>
+            <a:endParaRPr lang="en-GB" dirty="0"/>
+          </a:p>
+          <a:p>
+            <a:pPr marL="0" indent="0">
+              <a:buNone/>
+            </a:pPr>
+            <a:r>
+              <a:rPr lang="en-GB" dirty="0"/>
+              <a:t>coins = {1, 3, 4, 7} </a:t>
+            </a:r>
+          </a:p>
+          <a:p>
+            <a:pPr marL="0" indent="0">
+              <a:buNone/>
+            </a:pPr>
+            <a:r>
+              <a:rPr lang="en-GB" dirty="0"/>
+              <a:t>N = 2000, x &lt;= 4000</a:t>
+            </a:r>
+          </a:p>
+          <a:p>
+            <a:pPr marL="0" indent="0">
+              <a:buNone/>
+            </a:pPr>
+            <a:endParaRPr lang="en-GB" dirty="0"/>
+          </a:p>
+          <a:p>
+            <a:pPr marL="0" indent="0">
+              <a:buNone/>
+            </a:pPr>
+            <a:r>
+              <a:rPr lang="en-GB" dirty="0"/>
+              <a:t>Dada una </a:t>
+            </a:r>
+            <a:r>
+              <a:rPr lang="en-GB" dirty="0" err="1"/>
+              <a:t>cantidad</a:t>
+            </a:r>
+            <a:r>
+              <a:rPr lang="en-GB" dirty="0"/>
+              <a:t> de dinero x se </a:t>
+            </a:r>
+            <a:r>
+              <a:rPr lang="en-GB" dirty="0" err="1"/>
+              <a:t>quiere</a:t>
+            </a:r>
+            <a:r>
+              <a:rPr lang="en-GB" dirty="0"/>
+              <a:t> </a:t>
+            </a:r>
+            <a:r>
+              <a:rPr lang="en-GB" dirty="0" err="1"/>
+              <a:t>saber</a:t>
+            </a:r>
+            <a:r>
+              <a:rPr lang="en-GB" dirty="0"/>
+              <a:t> </a:t>
+            </a:r>
+            <a:r>
+              <a:rPr lang="en-GB" dirty="0" err="1"/>
+              <a:t>cual</a:t>
+            </a:r>
+            <a:r>
+              <a:rPr lang="en-GB" dirty="0"/>
+              <a:t> es el </a:t>
+            </a:r>
+            <a:r>
+              <a:rPr lang="en-GB" dirty="0" err="1"/>
+              <a:t>mínimo</a:t>
+            </a:r>
+            <a:r>
+              <a:rPr lang="en-GB" dirty="0"/>
+              <a:t> </a:t>
+            </a:r>
+            <a:r>
+              <a:rPr lang="en-GB" dirty="0" err="1"/>
+              <a:t>número</a:t>
+            </a:r>
+            <a:r>
+              <a:rPr lang="en-GB" dirty="0"/>
+              <a:t> de </a:t>
+            </a:r>
+            <a:r>
+              <a:rPr lang="en-GB" dirty="0" err="1"/>
+              <a:t>monedas</a:t>
+            </a:r>
+            <a:r>
+              <a:rPr lang="en-GB" dirty="0"/>
+              <a:t> para </a:t>
+            </a:r>
+            <a:r>
+              <a:rPr lang="en-GB" dirty="0" err="1"/>
+              <a:t>representar</a:t>
+            </a:r>
+            <a:r>
+              <a:rPr lang="en-GB" dirty="0"/>
+              <a:t> la </a:t>
+            </a:r>
+            <a:r>
+              <a:rPr lang="en-GB" dirty="0" err="1"/>
+              <a:t>cantidad</a:t>
+            </a:r>
+            <a:r>
+              <a:rPr lang="en-GB" dirty="0"/>
+              <a:t>.</a:t>
+            </a:r>
+          </a:p>
+          <a:p>
+            <a:pPr marL="0" indent="0">
+              <a:buNone/>
+            </a:pPr>
+            <a:endParaRPr lang="en-GB" dirty="0"/>
+          </a:p>
+          <a:p>
+            <a:pPr marL="0" indent="0">
+              <a:buNone/>
+            </a:pPr>
+            <a:endParaRPr lang="en-GB" dirty="0"/>
+          </a:p>
+        </p:txBody>
+      </p:sp>
+    </p:spTree>
+    <p:extLst>
+      <p:ext uri="{BB962C8B-B14F-4D97-AF65-F5344CB8AC3E}">
+        <p14:creationId xmlns:p14="http://schemas.microsoft.com/office/powerpoint/2010/main" val="2618561518"/>
+      </p:ext>
+    </p:extLst>
+  </p:cSld>
+  <p:clrMapOvr>
+    <a:masterClrMapping/>
+  </p:clrMapOvr>
+</p:sld>
+</file>
+
 <file path=ppt/slides/slide19.xml><?xml version="1.0" encoding="utf-8"?>
 <p:sld xmlns:a="http://schemas.openxmlformats.org/drawingml/2006/main" xmlns:r="http://schemas.openxmlformats.org/officeDocument/2006/relationships" xmlns:p="http://schemas.openxmlformats.org/presentationml/2006/main">
   <p:cSld>
@@ -6444,58 +6491,14 @@
           <a:lstStyle/>
           <a:p>
             <a:r>
-              <a:rPr lang="en-GB" dirty="0" err="1"/>
-              <a:t>Problema</a:t>
-            </a:r>
-            <a:r>
               <a:rPr lang="en-GB" dirty="0"/>
-              <a:t> del </a:t>
-            </a:r>
-            <a:r>
-              <a:rPr lang="en-GB" dirty="0" err="1"/>
-              <a:t>cambio</a:t>
-            </a:r>
+              <a:t>f(7) = ?</a:t>
+            </a:r>
+          </a:p>
+          <a:p>
             <a:r>
               <a:rPr lang="en-GB" dirty="0"/>
-              <a:t> de </a:t>
-            </a:r>
-            <a:r>
-              <a:rPr lang="en-GB" dirty="0" err="1"/>
-              <a:t>moneda</a:t>
-            </a:r>
-            <a:r>
-              <a:rPr lang="en-GB" dirty="0"/>
-              <a:t>.</a:t>
-            </a:r>
-          </a:p>
-          <a:p>
-            <a:r>
-              <a:rPr lang="en-GB" dirty="0"/>
-              <a:t>Se </a:t>
-            </a:r>
-            <a:r>
-              <a:rPr lang="en-GB" dirty="0" err="1"/>
-              <a:t>tiene</a:t>
-            </a:r>
-            <a:r>
-              <a:rPr lang="en-GB" dirty="0"/>
-              <a:t> un </a:t>
-            </a:r>
-            <a:r>
-              <a:rPr lang="en-GB" dirty="0" err="1"/>
-              <a:t>arreglo</a:t>
-            </a:r>
-            <a:r>
-              <a:rPr lang="en-GB" dirty="0"/>
-              <a:t> de </a:t>
-            </a:r>
-            <a:r>
-              <a:rPr lang="en-GB" dirty="0" err="1"/>
-              <a:t>monedas</a:t>
-            </a:r>
-            <a:r>
-              <a:rPr lang="en-GB" dirty="0"/>
-              <a:t>:</a:t>
+              <a:t>f(10) = ?</a:t>
             </a:r>
           </a:p>
           <a:p>
@@ -6508,117 +6511,6 @@
             <a:pPr marL="0" indent="0">
               <a:buNone/>
             </a:pPr>
-            <a:r>
-              <a:rPr lang="en-GB" dirty="0"/>
-              <a:t>coins = {1, 3, 4, 7} </a:t>
-            </a:r>
-          </a:p>
-          <a:p>
-            <a:pPr marL="0" indent="0">
-              <a:buNone/>
-            </a:pPr>
-            <a:r>
-              <a:rPr lang="en-GB" dirty="0"/>
-              <a:t>N = 2000, x &lt;= 4000</a:t>
-            </a:r>
-          </a:p>
-          <a:p>
-            <a:pPr marL="0" indent="0">
-              <a:buNone/>
-            </a:pPr>
-            <a:endParaRPr lang="en-GB" dirty="0"/>
-          </a:p>
-          <a:p>
-            <a:pPr marL="0" indent="0">
-              <a:buNone/>
-            </a:pPr>
-            <a:r>
-              <a:rPr lang="en-GB" dirty="0"/>
-              <a:t>Dada una </a:t>
-            </a:r>
-            <a:r>
-              <a:rPr lang="en-GB" dirty="0" err="1"/>
-              <a:t>cantidad</a:t>
-            </a:r>
-            <a:r>
-              <a:rPr lang="en-GB" dirty="0"/>
-              <a:t> de dinero x se </a:t>
-            </a:r>
-            <a:r>
-              <a:rPr lang="en-GB" dirty="0" err="1"/>
-              <a:t>quiere</a:t>
-            </a:r>
-            <a:r>
-              <a:rPr lang="en-GB" dirty="0"/>
-              <a:t> </a:t>
-            </a:r>
-            <a:r>
-              <a:rPr lang="en-GB" dirty="0" err="1"/>
-              <a:t>saber</a:t>
-            </a:r>
-            <a:r>
-              <a:rPr lang="en-GB" dirty="0"/>
-              <a:t> </a:t>
-            </a:r>
-            <a:r>
-              <a:rPr lang="en-GB" dirty="0" err="1"/>
-              <a:t>cual</a:t>
-            </a:r>
-            <a:r>
-              <a:rPr lang="en-GB" dirty="0"/>
-              <a:t> es el </a:t>
-            </a:r>
-            <a:r>
-              <a:rPr lang="en-GB" dirty="0" err="1"/>
-              <a:t>mínimo</a:t>
-            </a:r>
-            <a:r>
-              <a:rPr lang="en-GB" dirty="0"/>
-              <a:t> </a:t>
-            </a:r>
-            <a:r>
-              <a:rPr lang="en-GB" dirty="0" err="1"/>
-              <a:t>número</a:t>
-            </a:r>
-            <a:r>
-              <a:rPr lang="en-GB" dirty="0"/>
-              <a:t> de </a:t>
-            </a:r>
-            <a:r>
-              <a:rPr lang="en-GB" dirty="0" err="1"/>
-              <a:t>monedas</a:t>
-            </a:r>
-            <a:r>
-              <a:rPr lang="en-GB" dirty="0"/>
-              <a:t> para </a:t>
-            </a:r>
-            <a:r>
-              <a:rPr lang="en-GB" dirty="0" err="1"/>
-              <a:t>representar</a:t>
-            </a:r>
-            <a:r>
-              <a:rPr lang="en-GB" dirty="0"/>
-              <a:t> la </a:t>
-            </a:r>
-            <a:r>
-              <a:rPr lang="en-GB" dirty="0" err="1"/>
-              <a:t>cantidad</a:t>
-            </a:r>
-            <a:r>
-              <a:rPr lang="en-GB" dirty="0"/>
-              <a:t>.</a:t>
-            </a:r>
-          </a:p>
-          <a:p>
-            <a:pPr marL="0" indent="0">
-              <a:buNone/>
-            </a:pPr>
-            <a:endParaRPr lang="en-GB" dirty="0"/>
-          </a:p>
-          <a:p>
-            <a:pPr marL="0" indent="0">
-              <a:buNone/>
-            </a:pPr>
             <a:endParaRPr lang="en-GB" dirty="0"/>
           </a:p>
         </p:txBody>
@@ -6626,7 +6518,7 @@
     </p:spTree>
     <p:extLst>
       <p:ext uri="{BB962C8B-B14F-4D97-AF65-F5344CB8AC3E}">
-        <p14:creationId xmlns:p14="http://schemas.microsoft.com/office/powerpoint/2010/main" val="2618561518"/>
+        <p14:creationId xmlns:p14="http://schemas.microsoft.com/office/powerpoint/2010/main" val="3659756375"/>
       </p:ext>
     </p:extLst>
   </p:cSld>
@@ -6745,6 +6637,17 @@
               <a:buChar char="•"/>
             </a:pPr>
             <a:r>
+              <a:rPr lang="es-CO" sz="2400">
+                <a:solidFill>
+                  <a:schemeClr val="tx1">
+                    <a:lumMod val="65000"/>
+                    <a:lumOff val="35000"/>
+                  </a:schemeClr>
+                </a:solidFill>
+              </a:rPr>
+              <a:t>Resuelve </a:t>
+            </a:r>
+            <a:r>
               <a:rPr lang="es-CO" sz="2400" dirty="0">
                 <a:solidFill>
                   <a:schemeClr val="tx1">
@@ -6753,7 +6656,7 @@
                   </a:schemeClr>
                 </a:solidFill>
               </a:rPr>
-              <a:t>Resuelve problemas combinando las soluciones de los subproblemas.</a:t>
+              <a:t>problemas combinando las soluciones de los subproblemas.</a:t>
             </a:r>
           </a:p>
           <a:p>
@@ -6963,13 +6866,29 @@
           <a:p>
             <a:r>
               <a:rPr lang="en-GB" dirty="0"/>
-              <a:t>f(7) = ?</a:t>
-            </a:r>
-          </a:p>
-          <a:p>
+              <a:t>f(7) = 1 que </a:t>
+            </a:r>
+            <a:r>
+              <a:rPr lang="en-GB" dirty="0" err="1"/>
+              <a:t>sería</a:t>
+            </a:r>
             <a:r>
               <a:rPr lang="en-GB" dirty="0"/>
-              <a:t>f(10) = ?</a:t>
+              <a:t> usar la </a:t>
+            </a:r>
+            <a:r>
+              <a:rPr lang="en-GB" dirty="0" err="1"/>
+              <a:t>moneda</a:t>
+            </a:r>
+            <a:r>
+              <a:rPr lang="en-GB" dirty="0"/>
+              <a:t> 7</a:t>
+            </a:r>
+          </a:p>
+          <a:p>
+            <a:r>
+              <a:rPr lang="en-GB" dirty="0"/>
+              <a:t>f(10) = 3+7 ó 3+3+4</a:t>
             </a:r>
           </a:p>
           <a:p>
@@ -6989,7 +6908,7 @@
     </p:spTree>
     <p:extLst>
       <p:ext uri="{BB962C8B-B14F-4D97-AF65-F5344CB8AC3E}">
-        <p14:creationId xmlns:p14="http://schemas.microsoft.com/office/powerpoint/2010/main" val="3659756375"/>
+        <p14:creationId xmlns:p14="http://schemas.microsoft.com/office/powerpoint/2010/main" val="2838751875"/>
       </p:ext>
     </p:extLst>
   </p:cSld>
@@ -7065,31 +6984,108 @@
           <a:bodyPr/>
           <a:lstStyle/>
           <a:p>
+            <a:pPr marL="0" indent="0">
+              <a:buNone/>
+            </a:pPr>
             <a:r>
               <a:rPr lang="en-GB" dirty="0"/>
-              <a:t>f(7) = 1 que </a:t>
+              <a:t>Este </a:t>
             </a:r>
             <a:r>
               <a:rPr lang="en-GB" dirty="0" err="1"/>
-              <a:t>sería</a:t>
+              <a:t>problema</a:t>
             </a:r>
             <a:r>
               <a:rPr lang="en-GB" dirty="0"/>
-              <a:t> usar la </a:t>
+              <a:t> se </a:t>
             </a:r>
             <a:r>
               <a:rPr lang="en-GB" dirty="0" err="1"/>
-              <a:t>moneda</a:t>
+              <a:t>puede</a:t>
             </a:r>
             <a:r>
               <a:rPr lang="en-GB" dirty="0"/>
-              <a:t> 7</a:t>
-            </a:r>
-          </a:p>
-          <a:p>
+              <a:t> resolver </a:t>
+            </a:r>
+            <a:r>
+              <a:rPr lang="en-GB" dirty="0" err="1"/>
+              <a:t>explorando</a:t>
+            </a:r>
             <a:r>
               <a:rPr lang="en-GB" dirty="0"/>
-              <a:t>f(10) = 3+7 ó 3+3+4</a:t>
+              <a:t> </a:t>
+            </a:r>
+            <a:r>
+              <a:rPr lang="en-GB" dirty="0" err="1"/>
+              <a:t>todas</a:t>
+            </a:r>
+            <a:r>
+              <a:rPr lang="en-GB" dirty="0"/>
+              <a:t> las </a:t>
+            </a:r>
+            <a:r>
+              <a:rPr lang="en-GB" dirty="0" err="1"/>
+              <a:t>posibilidades</a:t>
+            </a:r>
+            <a:r>
+              <a:rPr lang="en-GB" dirty="0"/>
+              <a:t> (se </a:t>
+            </a:r>
+            <a:r>
+              <a:rPr lang="en-GB" dirty="0" err="1"/>
+              <a:t>puede</a:t>
+            </a:r>
+            <a:r>
+              <a:rPr lang="en-GB" dirty="0"/>
+              <a:t> </a:t>
+            </a:r>
+            <a:r>
+              <a:rPr lang="en-GB" dirty="0" err="1"/>
+              <a:t>pensar</a:t>
+            </a:r>
+            <a:r>
+              <a:rPr lang="en-GB" dirty="0"/>
+              <a:t> </a:t>
+            </a:r>
+            <a:r>
+              <a:rPr lang="en-GB" dirty="0" err="1"/>
+              <a:t>inicialmente</a:t>
+            </a:r>
+            <a:r>
+              <a:rPr lang="en-GB" dirty="0"/>
+              <a:t> </a:t>
+            </a:r>
+            <a:r>
+              <a:rPr lang="en-GB" dirty="0" err="1"/>
+              <a:t>en</a:t>
+            </a:r>
+            <a:r>
+              <a:rPr lang="en-GB" dirty="0"/>
+              <a:t> </a:t>
+            </a:r>
+            <a:r>
+              <a:rPr lang="en-GB" dirty="0" err="1"/>
+              <a:t>fuerza</a:t>
+            </a:r>
+            <a:r>
+              <a:rPr lang="en-GB" dirty="0"/>
+              <a:t> </a:t>
+            </a:r>
+            <a:r>
+              <a:rPr lang="en-GB" dirty="0" err="1"/>
+              <a:t>bruta</a:t>
+            </a:r>
+            <a:r>
+              <a:rPr lang="en-GB" dirty="0"/>
+              <a:t> y </a:t>
+            </a:r>
+            <a:r>
+              <a:rPr lang="en-GB" dirty="0" err="1"/>
+              <a:t>recursividad</a:t>
+            </a:r>
+            <a:r>
+              <a:rPr lang="en-GB" dirty="0"/>
+              <a:t>)</a:t>
             </a:r>
           </a:p>
           <a:p>
@@ -7102,14 +7098,88 @@
             <a:pPr marL="0" indent="0">
               <a:buNone/>
             </a:pPr>
+            <a:r>
+              <a:rPr lang="en-GB" dirty="0"/>
+              <a:t>Se debe </a:t>
+            </a:r>
+            <a:r>
+              <a:rPr lang="en-GB" dirty="0" err="1"/>
+              <a:t>pensar</a:t>
+            </a:r>
+            <a:r>
+              <a:rPr lang="en-GB" dirty="0"/>
+              <a:t> </a:t>
+            </a:r>
+            <a:r>
+              <a:rPr lang="en-GB" dirty="0" err="1"/>
+              <a:t>en</a:t>
+            </a:r>
+            <a:r>
+              <a:rPr lang="en-GB" dirty="0"/>
+              <a:t> algo que sea </a:t>
+            </a:r>
+            <a:r>
+              <a:rPr lang="en-GB" dirty="0" err="1"/>
+              <a:t>fácil</a:t>
+            </a:r>
+            <a:r>
+              <a:rPr lang="en-GB" dirty="0"/>
+              <a:t> de </a:t>
+            </a:r>
+            <a:r>
+              <a:rPr lang="en-GB" dirty="0" err="1"/>
+              <a:t>memorizar</a:t>
+            </a:r>
+            <a:r>
+              <a:rPr lang="en-GB" dirty="0"/>
+              <a:t>.</a:t>
+            </a:r>
+          </a:p>
+          <a:p>
+            <a:pPr marL="0" indent="0">
+              <a:buNone/>
+            </a:pPr>
             <a:endParaRPr lang="en-GB" dirty="0"/>
+          </a:p>
+          <a:p>
+            <a:pPr marL="0" indent="0">
+              <a:buNone/>
+            </a:pPr>
+            <a:r>
+              <a:rPr lang="en-GB" dirty="0"/>
+              <a:t>¿</a:t>
+            </a:r>
+            <a:r>
+              <a:rPr lang="en-GB" dirty="0" err="1"/>
+              <a:t>Cual</a:t>
+            </a:r>
+            <a:r>
+              <a:rPr lang="en-GB" dirty="0"/>
+              <a:t> es el </a:t>
+            </a:r>
+            <a:r>
+              <a:rPr lang="en-GB" dirty="0" err="1"/>
+              <a:t>estado</a:t>
+            </a:r>
+            <a:r>
+              <a:rPr lang="en-GB" dirty="0"/>
+              <a:t> de la </a:t>
+            </a:r>
+            <a:r>
+              <a:rPr lang="en-GB" dirty="0" err="1"/>
+              <a:t>función</a:t>
+            </a:r>
+            <a:r>
+              <a:rPr lang="en-GB" dirty="0"/>
+              <a:t>?</a:t>
+            </a:r>
           </a:p>
         </p:txBody>
       </p:sp>
     </p:spTree>
     <p:extLst>
       <p:ext uri="{BB962C8B-B14F-4D97-AF65-F5344CB8AC3E}">
-        <p14:creationId xmlns:p14="http://schemas.microsoft.com/office/powerpoint/2010/main" val="2838751875"/>
+        <p14:creationId xmlns:p14="http://schemas.microsoft.com/office/powerpoint/2010/main" val="4208225857"/>
       </p:ext>
     </p:extLst>
   </p:cSld>
@@ -7185,32 +7255,117 @@
           <a:bodyPr/>
           <a:lstStyle/>
           <a:p>
+            <a:pPr>
+              <a:buFontTx/>
+              <a:buChar char="-"/>
+            </a:pPr>
+            <a:r>
+              <a:rPr lang="en-GB" dirty="0" err="1"/>
+              <a:t>Estados</a:t>
+            </a:r>
+            <a:r>
+              <a:rPr lang="en-GB" dirty="0"/>
+              <a:t> (x) </a:t>
+            </a:r>
+            <a:r>
+              <a:rPr lang="en-GB" dirty="0" err="1"/>
+              <a:t>cantidad</a:t>
+            </a:r>
+            <a:r>
+              <a:rPr lang="en-GB" dirty="0"/>
+              <a:t> a </a:t>
+            </a:r>
+            <a:r>
+              <a:rPr lang="en-GB" dirty="0" err="1"/>
+              <a:t>cambiar</a:t>
+            </a:r>
+            <a:r>
+              <a:rPr lang="en-GB" dirty="0"/>
+              <a:t> por </a:t>
+            </a:r>
+            <a:r>
+              <a:rPr lang="en-GB" dirty="0" err="1"/>
+              <a:t>monedas</a:t>
+            </a:r>
+            <a:endParaRPr lang="en-GB" dirty="0"/>
+          </a:p>
+          <a:p>
+            <a:pPr>
+              <a:buFontTx/>
+              <a:buChar char="-"/>
+            </a:pPr>
+            <a:r>
+              <a:rPr lang="en-GB" dirty="0"/>
+              <a:t>El </a:t>
+            </a:r>
+            <a:r>
+              <a:rPr lang="en-GB" dirty="0" err="1"/>
+              <a:t>arreglo</a:t>
+            </a:r>
+            <a:r>
+              <a:rPr lang="en-GB" dirty="0"/>
+              <a:t> de coins se </a:t>
+            </a:r>
+            <a:r>
+              <a:rPr lang="en-GB" dirty="0" err="1"/>
+              <a:t>puede</a:t>
+            </a:r>
+            <a:r>
+              <a:rPr lang="en-GB" dirty="0"/>
+              <a:t> usar sin </a:t>
+            </a:r>
+            <a:r>
+              <a:rPr lang="en-GB" dirty="0" err="1"/>
+              <a:t>enviarlo</a:t>
+            </a:r>
+            <a:endParaRPr lang="en-GB" dirty="0"/>
+          </a:p>
+          <a:p>
+            <a:pPr>
+              <a:buFontTx/>
+              <a:buChar char="-"/>
+            </a:pPr>
+            <a:r>
+              <a:rPr lang="en-GB" dirty="0"/>
+              <a:t>Casos base?</a:t>
+            </a:r>
+          </a:p>
+          <a:p>
+            <a:pPr>
+              <a:buFontTx/>
+              <a:buChar char="-"/>
+            </a:pPr>
+            <a:r>
+              <a:rPr lang="en-GB" dirty="0"/>
+              <a:t>Casos </a:t>
+            </a:r>
+            <a:r>
+              <a:rPr lang="en-GB" dirty="0" err="1"/>
+              <a:t>recursivos</a:t>
+            </a:r>
+            <a:r>
+              <a:rPr lang="en-GB" dirty="0"/>
+              <a:t>?</a:t>
+            </a:r>
+          </a:p>
+          <a:p>
+            <a:pPr>
+              <a:buFontTx/>
+              <a:buChar char="-"/>
+            </a:pPr>
+            <a:endParaRPr lang="en-GB" dirty="0"/>
+          </a:p>
+          <a:p>
             <a:pPr marL="0" indent="0">
               <a:buNone/>
             </a:pPr>
             <a:r>
               <a:rPr lang="en-GB" dirty="0"/>
-              <a:t>Este </a:t>
+              <a:t>f(x) -&gt; Que </a:t>
             </a:r>
             <a:r>
               <a:rPr lang="en-GB" dirty="0" err="1"/>
-              <a:t>problema</a:t>
-            </a:r>
-            <a:r>
-              <a:rPr lang="en-GB" dirty="0"/>
-              <a:t> se </a:t>
-            </a:r>
-            <a:r>
-              <a:rPr lang="en-GB" dirty="0" err="1"/>
-              <a:t>puede</a:t>
-            </a:r>
-            <a:r>
-              <a:rPr lang="en-GB" dirty="0"/>
-              <a:t> resolver </a:t>
-            </a:r>
-            <a:r>
-              <a:rPr lang="en-GB" dirty="0" err="1"/>
-              <a:t>explorando</a:t>
+              <a:t>pasa</a:t>
             </a:r>
             <a:r>
               <a:rPr lang="en-GB" dirty="0"/>
@@ -7218,23 +7373,7 @@
             </a:r>
             <a:r>
               <a:rPr lang="en-GB" dirty="0" err="1"/>
-              <a:t>todas</a:t>
-            </a:r>
-            <a:r>
-              <a:rPr lang="en-GB" dirty="0"/>
-              <a:t> las </a:t>
-            </a:r>
-            <a:r>
-              <a:rPr lang="en-GB" dirty="0" err="1"/>
-              <a:t>posibilidades</a:t>
-            </a:r>
-            <a:r>
-              <a:rPr lang="en-GB" dirty="0"/>
-              <a:t> (se </a:t>
-            </a:r>
-            <a:r>
-              <a:rPr lang="en-GB" dirty="0" err="1"/>
-              <a:t>puede</a:t>
+              <a:t>si</a:t>
             </a:r>
             <a:r>
               <a:rPr lang="en-GB" dirty="0"/>
@@ -7242,51 +7381,11 @@
             </a:r>
             <a:r>
               <a:rPr lang="en-GB" dirty="0" err="1"/>
-              <a:t>pensar</a:t>
+              <a:t>intento</a:t>
             </a:r>
             <a:r>
               <a:rPr lang="en-GB" dirty="0"/>
-              <a:t> </a:t>
-            </a:r>
-            <a:r>
-              <a:rPr lang="en-GB" dirty="0" err="1"/>
-              <a:t>inicialmente</a:t>
-            </a:r>
-            <a:r>
-              <a:rPr lang="en-GB" dirty="0"/>
-              <a:t> </a:t>
-            </a:r>
-            <a:r>
-              <a:rPr lang="en-GB" dirty="0" err="1"/>
-              <a:t>en</a:t>
-            </a:r>
-            <a:r>
-              <a:rPr lang="en-GB" dirty="0"/>
-              <a:t> </a:t>
-            </a:r>
-            <a:r>
-              <a:rPr lang="en-GB" dirty="0" err="1"/>
-              <a:t>fuerza</a:t>
-            </a:r>
-            <a:r>
-              <a:rPr lang="en-GB" dirty="0"/>
-              <a:t> </a:t>
-            </a:r>
-            <a:r>
-              <a:rPr lang="en-GB" dirty="0" err="1"/>
-              <a:t>bruta</a:t>
-            </a:r>
-            <a:r>
-              <a:rPr lang="en-GB" dirty="0"/>
-              <a:t> y </a:t>
-            </a:r>
-            <a:r>
-              <a:rPr lang="en-GB" dirty="0" err="1"/>
-              <a:t>recursividad</a:t>
-            </a:r>
-            <a:r>
-              <a:rPr lang="en-GB" dirty="0"/>
-              <a:t>)</a:t>
+              <a:t> con un x</a:t>
             </a:r>
           </a:p>
           <a:p>
@@ -7301,78 +7400,15 @@
             </a:pPr>
             <a:r>
               <a:rPr lang="en-GB" dirty="0"/>
-              <a:t>Se debe </a:t>
+              <a:t>x-coin[</a:t>
             </a:r>
             <a:r>
               <a:rPr lang="en-GB" dirty="0" err="1"/>
-              <a:t>pensar</a:t>
+              <a:t>i</a:t>
             </a:r>
             <a:r>
               <a:rPr lang="en-GB" dirty="0"/>
-              <a:t> </a:t>
-            </a:r>
-            <a:r>
-              <a:rPr lang="en-GB" dirty="0" err="1"/>
-              <a:t>en</a:t>
-            </a:r>
-            <a:r>
-              <a:rPr lang="en-GB" dirty="0"/>
-              <a:t> algo que sea </a:t>
-            </a:r>
-            <a:r>
-              <a:rPr lang="en-GB" dirty="0" err="1"/>
-              <a:t>fácil</a:t>
-            </a:r>
-            <a:r>
-              <a:rPr lang="en-GB" dirty="0"/>
-              <a:t> de </a:t>
-            </a:r>
-            <a:r>
-              <a:rPr lang="en-GB" dirty="0" err="1"/>
-              <a:t>memorizar</a:t>
-            </a:r>
-            <a:r>
-              <a:rPr lang="en-GB" dirty="0"/>
-              <a:t>.</a:t>
-            </a:r>
-          </a:p>
-          <a:p>
-            <a:pPr marL="0" indent="0">
-              <a:buNone/>
-            </a:pPr>
-            <a:endParaRPr lang="en-GB" dirty="0"/>
-          </a:p>
-          <a:p>
-            <a:pPr marL="0" indent="0">
-              <a:buNone/>
-            </a:pPr>
-            <a:r>
-              <a:rPr lang="en-GB" dirty="0"/>
-              <a:t>¿</a:t>
-            </a:r>
-            <a:r>
-              <a:rPr lang="en-GB" dirty="0" err="1"/>
-              <a:t>Cual</a:t>
-            </a:r>
-            <a:r>
-              <a:rPr lang="en-GB" dirty="0"/>
-              <a:t> es el </a:t>
-            </a:r>
-            <a:r>
-              <a:rPr lang="en-GB" dirty="0" err="1"/>
-              <a:t>estado</a:t>
-            </a:r>
-            <a:r>
-              <a:rPr lang="en-GB" dirty="0"/>
-              <a:t> de la </a:t>
-            </a:r>
-            <a:r>
-              <a:rPr lang="en-GB" dirty="0" err="1"/>
-              <a:t>función</a:t>
-            </a:r>
-            <a:r>
-              <a:rPr lang="en-GB" dirty="0"/>
-              <a:t>?</a:t>
+              <a:t>] </a:t>
             </a:r>
           </a:p>
         </p:txBody>
@@ -7380,7 +7416,7 @@
     </p:spTree>
     <p:extLst>
       <p:ext uri="{BB962C8B-B14F-4D97-AF65-F5344CB8AC3E}">
-        <p14:creationId xmlns:p14="http://schemas.microsoft.com/office/powerpoint/2010/main" val="4208225857"/>
+        <p14:creationId xmlns:p14="http://schemas.microsoft.com/office/powerpoint/2010/main" val="3959868154"/>
       </p:ext>
     </p:extLst>
   </p:cSld>
@@ -7435,245 +7471,8 @@
           </a:p>
         </p:txBody>
       </p:sp>
-      <p:sp>
-        <p:nvSpPr>
-          <p:cNvPr id="3" name="Content Placeholder 2">
-            <a:extLst>
-              <a:ext uri="{FF2B5EF4-FFF2-40B4-BE49-F238E27FC236}">
-                <a16:creationId xmlns:a16="http://schemas.microsoft.com/office/drawing/2014/main" id="{6D3CB94B-BDC3-40E0-B966-05A4C653F66C}"/>
-              </a:ext>
-            </a:extLst>
-          </p:cNvPr>
-          <p:cNvSpPr>
-            <a:spLocks noGrp="1"/>
-          </p:cNvSpPr>
-          <p:nvPr>
-            <p:ph idx="1"/>
-          </p:nvPr>
-        </p:nvSpPr>
-        <p:spPr/>
-        <p:txBody>
-          <a:bodyPr/>
-          <a:lstStyle/>
-          <a:p>
-            <a:pPr>
-              <a:buFontTx/>
-              <a:buChar char="-"/>
-            </a:pPr>
-            <a:r>
-              <a:rPr lang="en-GB" dirty="0" err="1"/>
-              <a:t>Estados</a:t>
-            </a:r>
-            <a:r>
-              <a:rPr lang="en-GB" dirty="0"/>
-              <a:t> (x) </a:t>
-            </a:r>
-            <a:r>
-              <a:rPr lang="en-GB" dirty="0" err="1"/>
-              <a:t>cantidad</a:t>
-            </a:r>
-            <a:r>
-              <a:rPr lang="en-GB" dirty="0"/>
-              <a:t> a </a:t>
-            </a:r>
-            <a:r>
-              <a:rPr lang="en-GB" dirty="0" err="1"/>
-              <a:t>cambiar</a:t>
-            </a:r>
-            <a:r>
-              <a:rPr lang="en-GB" dirty="0"/>
-              <a:t> por </a:t>
-            </a:r>
-            <a:r>
-              <a:rPr lang="en-GB" dirty="0" err="1"/>
-              <a:t>monedas</a:t>
-            </a:r>
-            <a:endParaRPr lang="en-GB" dirty="0"/>
-          </a:p>
-          <a:p>
-            <a:pPr>
-              <a:buFontTx/>
-              <a:buChar char="-"/>
-            </a:pPr>
-            <a:r>
-              <a:rPr lang="en-GB" dirty="0"/>
-              <a:t>El </a:t>
-            </a:r>
-            <a:r>
-              <a:rPr lang="en-GB" dirty="0" err="1"/>
-              <a:t>arreglo</a:t>
-            </a:r>
-            <a:r>
-              <a:rPr lang="en-GB" dirty="0"/>
-              <a:t> de coins se </a:t>
-            </a:r>
-            <a:r>
-              <a:rPr lang="en-GB" dirty="0" err="1"/>
-              <a:t>puede</a:t>
-            </a:r>
-            <a:r>
-              <a:rPr lang="en-GB" dirty="0"/>
-              <a:t> usar sin </a:t>
-            </a:r>
-            <a:r>
-              <a:rPr lang="en-GB" dirty="0" err="1"/>
-              <a:t>enviarlo</a:t>
-            </a:r>
-            <a:endParaRPr lang="en-GB" dirty="0"/>
-          </a:p>
-          <a:p>
-            <a:pPr>
-              <a:buFontTx/>
-              <a:buChar char="-"/>
-            </a:pPr>
-            <a:r>
-              <a:rPr lang="en-GB" dirty="0"/>
-              <a:t>Casos base?</a:t>
-            </a:r>
-          </a:p>
-          <a:p>
-            <a:pPr>
-              <a:buFontTx/>
-              <a:buChar char="-"/>
-            </a:pPr>
-            <a:r>
-              <a:rPr lang="en-GB" dirty="0"/>
-              <a:t>Casos </a:t>
-            </a:r>
-            <a:r>
-              <a:rPr lang="en-GB" dirty="0" err="1"/>
-              <a:t>recursivos</a:t>
-            </a:r>
-            <a:r>
-              <a:rPr lang="en-GB" dirty="0"/>
-              <a:t>?</a:t>
-            </a:r>
-          </a:p>
-          <a:p>
-            <a:pPr>
-              <a:buFontTx/>
-              <a:buChar char="-"/>
-            </a:pPr>
-            <a:endParaRPr lang="en-GB" dirty="0"/>
-          </a:p>
-          <a:p>
-            <a:pPr marL="0" indent="0">
-              <a:buNone/>
-            </a:pPr>
-            <a:r>
-              <a:rPr lang="en-GB" dirty="0"/>
-              <a:t>f(x) -&gt; Que </a:t>
-            </a:r>
-            <a:r>
-              <a:rPr lang="en-GB" dirty="0" err="1"/>
-              <a:t>pasa</a:t>
-            </a:r>
-            <a:r>
-              <a:rPr lang="en-GB" dirty="0"/>
-              <a:t> </a:t>
-            </a:r>
-            <a:r>
-              <a:rPr lang="en-GB" dirty="0" err="1"/>
-              <a:t>si</a:t>
-            </a:r>
-            <a:r>
-              <a:rPr lang="en-GB" dirty="0"/>
-              <a:t> </a:t>
-            </a:r>
-            <a:r>
-              <a:rPr lang="en-GB" dirty="0" err="1"/>
-              <a:t>intento</a:t>
-            </a:r>
-            <a:r>
-              <a:rPr lang="en-GB" dirty="0"/>
-              <a:t> con un x</a:t>
-            </a:r>
-          </a:p>
-          <a:p>
-            <a:pPr marL="0" indent="0">
-              <a:buNone/>
-            </a:pPr>
-            <a:endParaRPr lang="en-GB" dirty="0"/>
-          </a:p>
-          <a:p>
-            <a:pPr marL="0" indent="0">
-              <a:buNone/>
-            </a:pPr>
-            <a:r>
-              <a:rPr lang="en-GB" dirty="0"/>
-              <a:t>x-coin[</a:t>
-            </a:r>
-            <a:r>
-              <a:rPr lang="en-GB" dirty="0" err="1"/>
-              <a:t>i</a:t>
-            </a:r>
-            <a:r>
-              <a:rPr lang="en-GB" dirty="0"/>
-              <a:t>] </a:t>
-            </a:r>
-          </a:p>
-        </p:txBody>
-      </p:sp>
-    </p:spTree>
-    <p:extLst>
-      <p:ext uri="{BB962C8B-B14F-4D97-AF65-F5344CB8AC3E}">
-        <p14:creationId xmlns:p14="http://schemas.microsoft.com/office/powerpoint/2010/main" val="3959868154"/>
-      </p:ext>
-    </p:extLst>
-  </p:cSld>
-  <p:clrMapOvr>
-    <a:masterClrMapping/>
-  </p:clrMapOvr>
-</p:sld>
-</file>
-
-<file path=ppt/slides/slide24.xml><?xml version="1.0" encoding="utf-8"?>
-<p:sld xmlns:a="http://schemas.openxmlformats.org/drawingml/2006/main" xmlns:r="http://schemas.openxmlformats.org/officeDocument/2006/relationships" xmlns:p="http://schemas.openxmlformats.org/presentationml/2006/main">
-  <p:cSld>
-    <p:spTree>
-      <p:nvGrpSpPr>
-        <p:cNvPr id="1" name=""/>
-        <p:cNvGrpSpPr/>
-        <p:nvPr/>
-      </p:nvGrpSpPr>
-      <p:grpSpPr>
-        <a:xfrm>
-          <a:off x="0" y="0"/>
-          <a:ext cx="0" cy="0"/>
-          <a:chOff x="0" y="0"/>
-          <a:chExt cx="0" cy="0"/>
-        </a:xfrm>
-      </p:grpSpPr>
-      <p:sp>
-        <p:nvSpPr>
-          <p:cNvPr id="2" name="Title 1">
-            <a:extLst>
-              <a:ext uri="{FF2B5EF4-FFF2-40B4-BE49-F238E27FC236}">
-                <a16:creationId xmlns:a16="http://schemas.microsoft.com/office/drawing/2014/main" id="{FE15285C-C8F4-4C93-935E-B607342419B7}"/>
-              </a:ext>
-            </a:extLst>
-          </p:cNvPr>
-          <p:cNvSpPr>
-            <a:spLocks noGrp="1"/>
-          </p:cNvSpPr>
-          <p:nvPr>
-            <p:ph type="title"/>
-          </p:nvPr>
-        </p:nvSpPr>
-        <p:spPr/>
-        <p:txBody>
-          <a:bodyPr/>
-          <a:lstStyle/>
-          <a:p>
-            <a:r>
-              <a:rPr lang="en-GB" dirty="0"/>
-              <a:t>Coin change</a:t>
-            </a:r>
-          </a:p>
-        </p:txBody>
-      </p:sp>
-      <mc:AlternateContent xmlns:mc="http://schemas.openxmlformats.org/markup-compatibility/2006">
-        <mc:Choice xmlns:a14="http://schemas.microsoft.com/office/drawing/2010/main" Requires="a14">
+      <mc:AlternateContent xmlns:mc="http://schemas.openxmlformats.org/markup-compatibility/2006" xmlns:a14="http://schemas.microsoft.com/office/drawing/2010/main">
+        <mc:Choice Requires="a14">
           <p:sp>
             <p:nvSpPr>
               <p:cNvPr id="3" name="Content Placeholder 2">
@@ -8034,7 +7833,7 @@
             </p:txBody>
           </p:sp>
         </mc:Choice>
-        <mc:Fallback>
+        <mc:Fallback xmlns="">
           <p:sp>
             <p:nvSpPr>
               <p:cNvPr id="3" name="Content Placeholder 2">
@@ -8078,8 +7877,8 @@
           </p:sp>
         </mc:Fallback>
       </mc:AlternateContent>
-      <mc:AlternateContent xmlns:mc="http://schemas.openxmlformats.org/markup-compatibility/2006">
-        <mc:Choice xmlns:p14="http://schemas.microsoft.com/office/powerpoint/2010/main" Requires="p14">
+      <mc:AlternateContent xmlns:mc="http://schemas.openxmlformats.org/markup-compatibility/2006" xmlns:p14="http://schemas.microsoft.com/office/powerpoint/2010/main">
+        <mc:Choice Requires="p14">
           <p:contentPart p14:bwMode="auto" r:id="rId3">
             <p14:nvContentPartPr>
               <p14:cNvPr id="4" name="Ink 3">
@@ -8098,7 +7897,7 @@
             </p14:xfrm>
           </p:contentPart>
         </mc:Choice>
-        <mc:Fallback>
+        <mc:Fallback xmlns="">
           <p:pic>
             <p:nvPicPr>
               <p:cNvPr id="4" name="Ink 3">
@@ -8142,6 +7941,178 @@
 </p:sld>
 </file>
 
+<file path=ppt/slides/slide24.xml><?xml version="1.0" encoding="utf-8"?>
+<p:sld xmlns:a="http://schemas.openxmlformats.org/drawingml/2006/main" xmlns:r="http://schemas.openxmlformats.org/officeDocument/2006/relationships" xmlns:p="http://schemas.openxmlformats.org/presentationml/2006/main">
+  <p:cSld>
+    <p:spTree>
+      <p:nvGrpSpPr>
+        <p:cNvPr id="1" name=""/>
+        <p:cNvGrpSpPr/>
+        <p:nvPr/>
+      </p:nvGrpSpPr>
+      <p:grpSpPr>
+        <a:xfrm>
+          <a:off x="0" y="0"/>
+          <a:ext cx="0" cy="0"/>
+          <a:chOff x="0" y="0"/>
+          <a:chExt cx="0" cy="0"/>
+        </a:xfrm>
+      </p:grpSpPr>
+      <p:sp>
+        <p:nvSpPr>
+          <p:cNvPr id="2" name="Title 1">
+            <a:extLst>
+              <a:ext uri="{FF2B5EF4-FFF2-40B4-BE49-F238E27FC236}">
+                <a16:creationId xmlns:a16="http://schemas.microsoft.com/office/drawing/2014/main" id="{FE15285C-C8F4-4C93-935E-B607342419B7}"/>
+              </a:ext>
+            </a:extLst>
+          </p:cNvPr>
+          <p:cNvSpPr>
+            <a:spLocks noGrp="1"/>
+          </p:cNvSpPr>
+          <p:nvPr>
+            <p:ph type="title"/>
+          </p:nvPr>
+        </p:nvSpPr>
+        <p:spPr/>
+        <p:txBody>
+          <a:bodyPr/>
+          <a:lstStyle/>
+          <a:p>
+            <a:r>
+              <a:rPr lang="en-GB" dirty="0"/>
+              <a:t>Coin change</a:t>
+            </a:r>
+          </a:p>
+        </p:txBody>
+      </p:sp>
+      <p:sp>
+        <p:nvSpPr>
+          <p:cNvPr id="3" name="Content Placeholder 2">
+            <a:extLst>
+              <a:ext uri="{FF2B5EF4-FFF2-40B4-BE49-F238E27FC236}">
+                <a16:creationId xmlns:a16="http://schemas.microsoft.com/office/drawing/2014/main" id="{6D3CB94B-BDC3-40E0-B966-05A4C653F66C}"/>
+              </a:ext>
+            </a:extLst>
+          </p:cNvPr>
+          <p:cNvSpPr>
+            <a:spLocks noGrp="1"/>
+          </p:cNvSpPr>
+          <p:nvPr>
+            <p:ph idx="1"/>
+          </p:nvPr>
+        </p:nvSpPr>
+        <p:spPr>
+          <a:xfrm>
+            <a:off x="470452" y="1600200"/>
+            <a:ext cx="8229600" cy="4525963"/>
+          </a:xfrm>
+        </p:spPr>
+        <p:txBody>
+          <a:bodyPr/>
+          <a:lstStyle/>
+          <a:p>
+            <a:pPr marL="0" indent="0">
+              <a:buNone/>
+            </a:pPr>
+            <a:r>
+              <a:rPr lang="en-GB" dirty="0"/>
+              <a:t>Para </a:t>
+            </a:r>
+            <a:r>
+              <a:rPr lang="en-GB" dirty="0" err="1"/>
+              <a:t>cada</a:t>
+            </a:r>
+            <a:r>
+              <a:rPr lang="en-GB" dirty="0"/>
+              <a:t> </a:t>
+            </a:r>
+            <a:r>
+              <a:rPr lang="en-GB" dirty="0" err="1"/>
+              <a:t>estado</a:t>
+            </a:r>
+            <a:r>
+              <a:rPr lang="en-GB" dirty="0"/>
+              <a:t> </a:t>
+            </a:r>
+            <a:r>
+              <a:rPr lang="en-GB" dirty="0" err="1"/>
+              <a:t>está</a:t>
+            </a:r>
+            <a:r>
+              <a:rPr lang="en-GB" dirty="0"/>
+              <a:t> </a:t>
+            </a:r>
+            <a:r>
+              <a:rPr lang="en-GB" dirty="0" err="1"/>
+              <a:t>iterando</a:t>
+            </a:r>
+            <a:r>
+              <a:rPr lang="en-GB" dirty="0"/>
+              <a:t> O(</a:t>
+            </a:r>
+            <a:r>
+              <a:rPr lang="en-GB" dirty="0" err="1"/>
+              <a:t>nx</a:t>
+            </a:r>
+            <a:r>
+              <a:rPr lang="en-GB" dirty="0"/>
+              <a:t>) </a:t>
+            </a:r>
+            <a:r>
+              <a:rPr lang="en-GB" dirty="0" err="1"/>
+              <a:t>veces</a:t>
+            </a:r>
+            <a:r>
+              <a:rPr lang="en-GB" dirty="0"/>
+              <a:t> </a:t>
+            </a:r>
+            <a:r>
+              <a:rPr lang="en-GB" b="1" dirty="0" err="1"/>
+              <a:t>si</a:t>
+            </a:r>
+            <a:r>
+              <a:rPr lang="en-GB" b="1" dirty="0"/>
+              <a:t> se </a:t>
+            </a:r>
+            <a:r>
+              <a:rPr lang="en-GB" b="1" dirty="0" err="1"/>
+              <a:t>memorizara</a:t>
+            </a:r>
+            <a:r>
+              <a:rPr lang="en-GB" b="1" dirty="0"/>
+              <a:t> la </a:t>
+            </a:r>
+            <a:r>
+              <a:rPr lang="en-GB" b="1" dirty="0" err="1"/>
+              <a:t>respuesta</a:t>
+            </a:r>
+            <a:r>
+              <a:rPr lang="en-GB" b="1" dirty="0"/>
+              <a:t>.</a:t>
+            </a:r>
+          </a:p>
+          <a:p>
+            <a:pPr marL="0" indent="0">
+              <a:buNone/>
+            </a:pPr>
+            <a:endParaRPr lang="en-GB" dirty="0"/>
+          </a:p>
+        </p:txBody>
+      </p:sp>
+    </p:spTree>
+    <p:extLst>
+      <p:ext uri="{BB962C8B-B14F-4D97-AF65-F5344CB8AC3E}">
+        <p14:creationId xmlns:p14="http://schemas.microsoft.com/office/powerpoint/2010/main" val="1644034709"/>
+      </p:ext>
+    </p:extLst>
+  </p:cSld>
+  <p:clrMapOvr>
+    <a:masterClrMapping/>
+  </p:clrMapOvr>
+</p:sld>
+</file>
+
 <file path=ppt/slides/slide25.xml><?xml version="1.0" encoding="utf-8"?>
 <p:sld xmlns:a="http://schemas.openxmlformats.org/drawingml/2006/main" xmlns:r="http://schemas.openxmlformats.org/officeDocument/2006/relationships" xmlns:p="http://schemas.openxmlformats.org/presentationml/2006/main">
   <p:cSld>
@@ -8164,7 +8135,7 @@
           <p:cNvPr id="2" name="Title 1">
             <a:extLst>
               <a:ext uri="{FF2B5EF4-FFF2-40B4-BE49-F238E27FC236}">
-                <a16:creationId xmlns:a16="http://schemas.microsoft.com/office/drawing/2014/main" id="{FE15285C-C8F4-4C93-935E-B607342419B7}"/>
+                <a16:creationId xmlns:a16="http://schemas.microsoft.com/office/drawing/2014/main" id="{6738258B-F269-483C-B417-F5B5527CA9DC}"/>
               </a:ext>
             </a:extLst>
           </p:cNvPr>
@@ -8181,9 +8152,10 @@
           <a:lstStyle/>
           <a:p>
             <a:r>
-              <a:rPr lang="en-GB" dirty="0"/>
-              <a:t>Coin change</a:t>
-            </a:r>
+              <a:rPr lang="es-CO" dirty="0"/>
+              <a:t>Se podría pensar de otra forma:</a:t>
+            </a:r>
+            <a:endParaRPr lang="en-GB" dirty="0"/>
           </a:p>
         </p:txBody>
       </p:sp>
@@ -8192,7 +8164,7 @@
           <p:cNvPr id="3" name="Content Placeholder 2">
             <a:extLst>
               <a:ext uri="{FF2B5EF4-FFF2-40B4-BE49-F238E27FC236}">
-                <a16:creationId xmlns:a16="http://schemas.microsoft.com/office/drawing/2014/main" id="{6D3CB94B-BDC3-40E0-B966-05A4C653F66C}"/>
+                <a16:creationId xmlns:a16="http://schemas.microsoft.com/office/drawing/2014/main" id="{CD17F822-51FB-4AE5-A7CE-7DE40A2CBB5F}"/>
               </a:ext>
             </a:extLst>
           </p:cNvPr>
@@ -8203,26 +8175,25 @@
             <p:ph idx="1"/>
           </p:nvPr>
         </p:nvSpPr>
-        <p:spPr>
-          <a:xfrm>
-            <a:off x="470452" y="1600200"/>
-            <a:ext cx="8229600" cy="4525963"/>
-          </a:xfrm>
-        </p:spPr>
+        <p:spPr/>
         <p:txBody>
           <a:bodyPr/>
           <a:lstStyle/>
           <a:p>
-            <a:pPr marL="0" indent="0">
-              <a:buNone/>
-            </a:pPr>
+            <a:r>
+              <a:rPr lang="es-CO" dirty="0"/>
+              <a:t>No importa el orden en el que use las monedas.</a:t>
+            </a:r>
+            <a:endParaRPr lang="en-GB" dirty="0"/>
+          </a:p>
+          <a:p>
             <a:r>
               <a:rPr lang="en-GB" dirty="0"/>
-              <a:t>Para </a:t>
+              <a:t>Se </a:t>
             </a:r>
             <a:r>
               <a:rPr lang="en-GB" dirty="0" err="1"/>
-              <a:t>cada</a:t>
+              <a:t>puede</a:t>
             </a:r>
             <a:r>
               <a:rPr lang="en-GB" dirty="0"/>
@@ -8230,7 +8201,69 @@
             </a:r>
             <a:r>
               <a:rPr lang="en-GB" dirty="0" err="1"/>
+              <a:t>definir</a:t>
+            </a:r>
+            <a:r>
+              <a:rPr lang="en-GB" dirty="0"/>
+              <a:t> un nuevo </a:t>
+            </a:r>
+            <a:r>
+              <a:rPr lang="en-GB" dirty="0" err="1"/>
               <a:t>estado</a:t>
+            </a:r>
+            <a:r>
+              <a:rPr lang="en-GB" dirty="0"/>
+              <a:t>: </a:t>
+            </a:r>
+          </a:p>
+          <a:p>
+            <a:r>
+              <a:rPr lang="en-GB" dirty="0"/>
+              <a:t>f(</a:t>
+            </a:r>
+            <a:r>
+              <a:rPr lang="en-GB" dirty="0" err="1"/>
+              <a:t>x,i</a:t>
+            </a:r>
+            <a:r>
+              <a:rPr lang="en-GB" dirty="0"/>
+              <a:t>) = </a:t>
+            </a:r>
+            <a:r>
+              <a:rPr lang="en-GB" dirty="0" err="1"/>
+              <a:t>mínimo</a:t>
+            </a:r>
+            <a:r>
+              <a:rPr lang="en-GB" dirty="0"/>
+              <a:t> para </a:t>
+            </a:r>
+            <a:r>
+              <a:rPr lang="en-GB" dirty="0" err="1"/>
+              <a:t>cambiar</a:t>
+            </a:r>
+            <a:r>
+              <a:rPr lang="en-GB" dirty="0"/>
+              <a:t> x </a:t>
+            </a:r>
+            <a:r>
+              <a:rPr lang="en-GB" dirty="0" err="1"/>
+              <a:t>si</a:t>
+            </a:r>
+            <a:r>
+              <a:rPr lang="en-GB" dirty="0"/>
+              <a:t> solo se </a:t>
+            </a:r>
+            <a:r>
+              <a:rPr lang="en-GB" dirty="0" err="1"/>
+              <a:t>pueden</a:t>
+            </a:r>
+            <a:r>
+              <a:rPr lang="en-GB" dirty="0"/>
+              <a:t> usar </a:t>
+            </a:r>
+            <a:r>
+              <a:rPr lang="en-GB" dirty="0" err="1"/>
+              <a:t>monedas</a:t>
             </a:r>
             <a:r>
               <a:rPr lang="en-GB" dirty="0"/>
@@ -8238,65 +8271,16 @@
             </a:r>
             <a:r>
               <a:rPr lang="en-GB" dirty="0" err="1"/>
-              <a:t>está</a:t>
+              <a:t>desde</a:t>
             </a:r>
             <a:r>
               <a:rPr lang="en-GB" dirty="0"/>
-              <a:t> </a:t>
+              <a:t> la cero a la </a:t>
             </a:r>
             <a:r>
               <a:rPr lang="en-GB" dirty="0" err="1"/>
-              <a:t>iterando</a:t>
-            </a:r>
-            <a:r>
-              <a:rPr lang="en-GB" dirty="0"/>
-              <a:t> O(</a:t>
-            </a:r>
-            <a:r>
-              <a:rPr lang="en-GB" dirty="0" err="1"/>
-              <a:t>nx</a:t>
-            </a:r>
-            <a:r>
-              <a:rPr lang="en-GB" dirty="0"/>
-              <a:t>) </a:t>
-            </a:r>
-            <a:r>
-              <a:rPr lang="en-GB" dirty="0" err="1"/>
-              <a:t>veces</a:t>
-            </a:r>
-            <a:r>
-              <a:rPr lang="en-GB" dirty="0"/>
-              <a:t> </a:t>
-            </a:r>
-            <a:r>
-              <a:rPr lang="en-GB" b="1" dirty="0" err="1"/>
-              <a:t>si</a:t>
-            </a:r>
-            <a:r>
-              <a:rPr lang="en-GB" b="1" dirty="0"/>
-              <a:t> se </a:t>
-            </a:r>
-            <a:r>
-              <a:rPr lang="en-GB" b="1" dirty="0" err="1"/>
-              <a:t>memorizara</a:t>
-            </a:r>
-            <a:r>
-              <a:rPr lang="en-GB" b="1" dirty="0"/>
-              <a:t> la </a:t>
-            </a:r>
-            <a:r>
-              <a:rPr lang="en-GB" b="1" dirty="0" err="1"/>
-              <a:t>respuesta</a:t>
-            </a:r>
-            <a:r>
-              <a:rPr lang="en-GB" b="1" dirty="0"/>
-              <a:t>.</a:t>
-            </a:r>
-          </a:p>
-          <a:p>
-            <a:pPr marL="0" indent="0">
-              <a:buNone/>
-            </a:pPr>
+              <a:t>i</a:t>
+            </a:r>
             <a:endParaRPr lang="en-GB" dirty="0"/>
           </a:p>
         </p:txBody>
@@ -8304,7 +8288,7 @@
     </p:spTree>
     <p:extLst>
       <p:ext uri="{BB962C8B-B14F-4D97-AF65-F5344CB8AC3E}">
-        <p14:creationId xmlns:p14="http://schemas.microsoft.com/office/powerpoint/2010/main" val="1644034709"/>
+        <p14:creationId xmlns:p14="http://schemas.microsoft.com/office/powerpoint/2010/main" val="120508801"/>
       </p:ext>
     </p:extLst>
   </p:cSld>
@@ -8336,191 +8320,6 @@
           <p:cNvPr id="2" name="Title 1">
             <a:extLst>
               <a:ext uri="{FF2B5EF4-FFF2-40B4-BE49-F238E27FC236}">
-                <a16:creationId xmlns:a16="http://schemas.microsoft.com/office/drawing/2014/main" id="{6738258B-F269-483C-B417-F5B5527CA9DC}"/>
-              </a:ext>
-            </a:extLst>
-          </p:cNvPr>
-          <p:cNvSpPr>
-            <a:spLocks noGrp="1"/>
-          </p:cNvSpPr>
-          <p:nvPr>
-            <p:ph type="title"/>
-          </p:nvPr>
-        </p:nvSpPr>
-        <p:spPr/>
-        <p:txBody>
-          <a:bodyPr/>
-          <a:lstStyle/>
-          <a:p>
-            <a:r>
-              <a:rPr lang="es-CO" dirty="0"/>
-              <a:t>Se podría pensar de otra forma:</a:t>
-            </a:r>
-            <a:endParaRPr lang="en-GB" dirty="0"/>
-          </a:p>
-        </p:txBody>
-      </p:sp>
-      <p:sp>
-        <p:nvSpPr>
-          <p:cNvPr id="3" name="Content Placeholder 2">
-            <a:extLst>
-              <a:ext uri="{FF2B5EF4-FFF2-40B4-BE49-F238E27FC236}">
-                <a16:creationId xmlns:a16="http://schemas.microsoft.com/office/drawing/2014/main" id="{CD17F822-51FB-4AE5-A7CE-7DE40A2CBB5F}"/>
-              </a:ext>
-            </a:extLst>
-          </p:cNvPr>
-          <p:cNvSpPr>
-            <a:spLocks noGrp="1"/>
-          </p:cNvSpPr>
-          <p:nvPr>
-            <p:ph idx="1"/>
-          </p:nvPr>
-        </p:nvSpPr>
-        <p:spPr/>
-        <p:txBody>
-          <a:bodyPr/>
-          <a:lstStyle/>
-          <a:p>
-            <a:r>
-              <a:rPr lang="es-CO" dirty="0"/>
-              <a:t>No importa el orden en el que use las monedas.</a:t>
-            </a:r>
-            <a:endParaRPr lang="en-GB" dirty="0"/>
-          </a:p>
-          <a:p>
-            <a:r>
-              <a:rPr lang="en-GB" dirty="0"/>
-              <a:t>Se </a:t>
-            </a:r>
-            <a:r>
-              <a:rPr lang="en-GB" dirty="0" err="1"/>
-              <a:t>puede</a:t>
-            </a:r>
-            <a:r>
-              <a:rPr lang="en-GB" dirty="0"/>
-              <a:t> </a:t>
-            </a:r>
-            <a:r>
-              <a:rPr lang="en-GB" dirty="0" err="1"/>
-              <a:t>definir</a:t>
-            </a:r>
-            <a:r>
-              <a:rPr lang="en-GB" dirty="0"/>
-              <a:t> un nuevo </a:t>
-            </a:r>
-            <a:r>
-              <a:rPr lang="en-GB" dirty="0" err="1"/>
-              <a:t>estado</a:t>
-            </a:r>
-            <a:r>
-              <a:rPr lang="en-GB" dirty="0"/>
-              <a:t>: </a:t>
-            </a:r>
-          </a:p>
-          <a:p>
-            <a:r>
-              <a:rPr lang="en-GB" dirty="0"/>
-              <a:t>f(</a:t>
-            </a:r>
-            <a:r>
-              <a:rPr lang="en-GB" dirty="0" err="1"/>
-              <a:t>x,i</a:t>
-            </a:r>
-            <a:r>
-              <a:rPr lang="en-GB" dirty="0"/>
-              <a:t>) = </a:t>
-            </a:r>
-            <a:r>
-              <a:rPr lang="en-GB" dirty="0" err="1"/>
-              <a:t>mínimo</a:t>
-            </a:r>
-            <a:r>
-              <a:rPr lang="en-GB" dirty="0"/>
-              <a:t> para </a:t>
-            </a:r>
-            <a:r>
-              <a:rPr lang="en-GB" dirty="0" err="1"/>
-              <a:t>cambiar</a:t>
-            </a:r>
-            <a:r>
-              <a:rPr lang="en-GB" dirty="0"/>
-              <a:t> x </a:t>
-            </a:r>
-            <a:r>
-              <a:rPr lang="en-GB" dirty="0" err="1"/>
-              <a:t>si</a:t>
-            </a:r>
-            <a:r>
-              <a:rPr lang="en-GB" dirty="0"/>
-              <a:t> solo se </a:t>
-            </a:r>
-            <a:r>
-              <a:rPr lang="en-GB" dirty="0" err="1"/>
-              <a:t>pueden</a:t>
-            </a:r>
-            <a:r>
-              <a:rPr lang="en-GB" dirty="0"/>
-              <a:t> usar </a:t>
-            </a:r>
-            <a:r>
-              <a:rPr lang="en-GB" dirty="0" err="1"/>
-              <a:t>monedas</a:t>
-            </a:r>
-            <a:r>
-              <a:rPr lang="en-GB" dirty="0"/>
-              <a:t> </a:t>
-            </a:r>
-            <a:r>
-              <a:rPr lang="en-GB" dirty="0" err="1"/>
-              <a:t>desde</a:t>
-            </a:r>
-            <a:r>
-              <a:rPr lang="en-GB" dirty="0"/>
-              <a:t> la cero a la </a:t>
-            </a:r>
-            <a:r>
-              <a:rPr lang="en-GB" dirty="0" err="1"/>
-              <a:t>i</a:t>
-            </a:r>
-            <a:endParaRPr lang="en-GB" dirty="0"/>
-          </a:p>
-        </p:txBody>
-      </p:sp>
-    </p:spTree>
-    <p:extLst>
-      <p:ext uri="{BB962C8B-B14F-4D97-AF65-F5344CB8AC3E}">
-        <p14:creationId xmlns:p14="http://schemas.microsoft.com/office/powerpoint/2010/main" val="120508801"/>
-      </p:ext>
-    </p:extLst>
-  </p:cSld>
-  <p:clrMapOvr>
-    <a:masterClrMapping/>
-  </p:clrMapOvr>
-</p:sld>
-</file>
-
-<file path=ppt/slides/slide27.xml><?xml version="1.0" encoding="utf-8"?>
-<p:sld xmlns:a="http://schemas.openxmlformats.org/drawingml/2006/main" xmlns:r="http://schemas.openxmlformats.org/officeDocument/2006/relationships" xmlns:p="http://schemas.openxmlformats.org/presentationml/2006/main">
-  <p:cSld>
-    <p:spTree>
-      <p:nvGrpSpPr>
-        <p:cNvPr id="1" name=""/>
-        <p:cNvGrpSpPr/>
-        <p:nvPr/>
-      </p:nvGrpSpPr>
-      <p:grpSpPr>
-        <a:xfrm>
-          <a:off x="0" y="0"/>
-          <a:ext cx="0" cy="0"/>
-          <a:chOff x="0" y="0"/>
-          <a:chExt cx="0" cy="0"/>
-        </a:xfrm>
-      </p:grpSpPr>
-      <p:sp>
-        <p:nvSpPr>
-          <p:cNvPr id="2" name="Title 1">
-            <a:extLst>
-              <a:ext uri="{FF2B5EF4-FFF2-40B4-BE49-F238E27FC236}">
                 <a16:creationId xmlns:a16="http://schemas.microsoft.com/office/drawing/2014/main" id="{FE15285C-C8F4-4C93-935E-B607342419B7}"/>
               </a:ext>
             </a:extLst>
@@ -8544,8 +8343,8 @@
           </a:p>
         </p:txBody>
       </p:sp>
-      <mc:AlternateContent xmlns:mc="http://schemas.openxmlformats.org/markup-compatibility/2006">
-        <mc:Choice xmlns:a14="http://schemas.microsoft.com/office/drawing/2010/main" Requires="a14">
+      <mc:AlternateContent xmlns:mc="http://schemas.openxmlformats.org/markup-compatibility/2006" xmlns:a14="http://schemas.microsoft.com/office/drawing/2010/main">
+        <mc:Choice Requires="a14">
           <p:sp>
             <p:nvSpPr>
               <p:cNvPr id="3" name="Content Placeholder 2">
@@ -9043,7 +8842,7 @@
             </p:txBody>
           </p:sp>
         </mc:Choice>
-        <mc:Fallback>
+        <mc:Fallback xmlns="">
           <p:sp>
             <p:nvSpPr>
               <p:cNvPr id="3" name="Content Placeholder 2">
@@ -9087,8 +8886,8 @@
           </p:sp>
         </mc:Fallback>
       </mc:AlternateContent>
-      <mc:AlternateContent xmlns:mc="http://schemas.openxmlformats.org/markup-compatibility/2006">
-        <mc:Choice xmlns:p14="http://schemas.microsoft.com/office/powerpoint/2010/main" Requires="p14">
+      <mc:AlternateContent xmlns:mc="http://schemas.openxmlformats.org/markup-compatibility/2006" xmlns:p14="http://schemas.microsoft.com/office/powerpoint/2010/main">
+        <mc:Choice Requires="p14">
           <p:contentPart p14:bwMode="auto" r:id="rId3">
             <p14:nvContentPartPr>
               <p14:cNvPr id="5" name="Ink 4">
@@ -9107,7 +8906,7 @@
             </p14:xfrm>
           </p:contentPart>
         </mc:Choice>
-        <mc:Fallback>
+        <mc:Fallback xmlns="">
           <p:pic>
             <p:nvPicPr>
               <p:cNvPr id="5" name="Ink 4">
@@ -9151,7 +8950,7 @@
 </p:sld>
 </file>
 
-<file path=ppt/slides/slide28.xml><?xml version="1.0" encoding="utf-8"?>
+<file path=ppt/slides/slide27.xml><?xml version="1.0" encoding="utf-8"?>
 <p:sld xmlns:a="http://schemas.openxmlformats.org/drawingml/2006/main" xmlns:r="http://schemas.openxmlformats.org/officeDocument/2006/relationships" xmlns:p="http://schemas.openxmlformats.org/presentationml/2006/main">
   <p:cSld>
     <p:spTree>

</xml_diff>